<commit_message>
Fixed a previously non-working test.
</commit_message>
<xml_diff>
--- a/beta.pptx
+++ b/beta.pptx
@@ -158,7 +158,7 @@
         <p:txBody>
           <a:bodyPr/>
           <a:p>
-            <a:fld id="{00CB20C4-AC44-491C-B346-8EE0C2639D79}" type="slidenum">
+            <a:fld id="{10217B84-3824-4A9A-BC80-731965417621}" type="slidenum">
               <a:t>&lt;#&gt;</a:t>
             </a:fld>
           </a:p>
@@ -321,7 +321,7 @@
         <p:txBody>
           <a:bodyPr/>
           <a:p>
-            <a:fld id="{54D7FB5F-B69F-4150-87FA-49C85B8B404B}" type="slidenum">
+            <a:fld id="{2D6CDAC5-CAB9-4305-8962-AF0CE2CC0A2A}" type="slidenum">
               <a:t>&lt;#&gt;</a:t>
             </a:fld>
           </a:p>
@@ -487,7 +487,7 @@
         <p:txBody>
           <a:bodyPr/>
           <a:p>
-            <a:fld id="{75D75109-A76D-40E1-A156-6F5EAC220B6D}" type="slidenum">
+            <a:fld id="{39E8F91C-0D66-439F-AAFA-7866356D7E37}" type="slidenum">
               <a:t>&lt;#&gt;</a:t>
             </a:fld>
           </a:p>
@@ -653,7 +653,7 @@
         <p:txBody>
           <a:bodyPr/>
           <a:p>
-            <a:fld id="{5D56D70E-093B-4CB8-A82D-0D86639ED9AD}" type="slidenum">
+            <a:fld id="{9F741934-4BA5-4A96-9682-8A7AB2F89FD9}" type="slidenum">
               <a:t>&lt;#&gt;</a:t>
             </a:fld>
           </a:p>
@@ -819,7 +819,7 @@
         <p:txBody>
           <a:bodyPr/>
           <a:p>
-            <a:fld id="{CA42B1DD-5EB2-4F8F-A461-B7078098F45E}" type="slidenum">
+            <a:fld id="{6F6B1267-FB13-4069-85CA-982D86BC0673}" type="slidenum">
               <a:t>&lt;#&gt;</a:t>
             </a:fld>
           </a:p>
@@ -1345,7 +1345,7 @@
                 <a:tab algn="l" pos="0"/>
               </a:tabLst>
             </a:pPr>
-            <a:fld id="{30B51D8B-49B3-4B46-B9D4-C018B43739FA}" type="slidenum">
+            <a:fld id="{74757FF5-7C24-4218-A0CE-5B4DCCEF9B96}" type="slidenum">
               <a:rPr b="0" lang="en-US" sz="2600" spc="-1" strike="noStrike">
                 <a:solidFill>
                   <a:srgbClr val="000000"/>
@@ -1701,7 +1701,7 @@
                 <a:tab algn="l" pos="0"/>
               </a:tabLst>
             </a:pPr>
-            <a:fld id="{59CED775-02F6-4239-AA10-C8F2CC004EA3}" type="slidenum">
+            <a:fld id="{78CE374C-C514-4E80-AFF6-A00F78700478}" type="slidenum">
               <a:rPr b="0" lang="en-US" sz="2600" spc="-1" strike="noStrike">
                 <a:solidFill>
                   <a:srgbClr val="000000"/>
@@ -2219,7 +2219,313 @@
                 </a:solidFill>
                 <a:latin typeface="Arial"/>
               </a:rPr>
-              <a:t>Click to edit the title text format</a:t>
+              <a:t>C</a:t>
+            </a:r>
+            <a:r>
+              <a:rPr b="0" lang="en-US" sz="1800" spc="-1" strike="noStrike">
+                <a:solidFill>
+                  <a:srgbClr val="000000"/>
+                </a:solidFill>
+                <a:latin typeface="Arial"/>
+              </a:rPr>
+              <a:t>l</a:t>
+            </a:r>
+            <a:r>
+              <a:rPr b="0" lang="en-US" sz="1800" spc="-1" strike="noStrike">
+                <a:solidFill>
+                  <a:srgbClr val="000000"/>
+                </a:solidFill>
+                <a:latin typeface="Arial"/>
+              </a:rPr>
+              <a:t>i</a:t>
+            </a:r>
+            <a:r>
+              <a:rPr b="0" lang="en-US" sz="1800" spc="-1" strike="noStrike">
+                <a:solidFill>
+                  <a:srgbClr val="000000"/>
+                </a:solidFill>
+                <a:latin typeface="Arial"/>
+              </a:rPr>
+              <a:t>c</a:t>
+            </a:r>
+            <a:r>
+              <a:rPr b="0" lang="en-US" sz="1800" spc="-1" strike="noStrike">
+                <a:solidFill>
+                  <a:srgbClr val="000000"/>
+                </a:solidFill>
+                <a:latin typeface="Arial"/>
+              </a:rPr>
+              <a:t>k</a:t>
+            </a:r>
+            <a:r>
+              <a:rPr b="0" lang="en-US" sz="1800" spc="-1" strike="noStrike">
+                <a:solidFill>
+                  <a:srgbClr val="000000"/>
+                </a:solidFill>
+                <a:latin typeface="Arial"/>
+              </a:rPr>
+              <a:t> </a:t>
+            </a:r>
+            <a:r>
+              <a:rPr b="0" lang="en-US" sz="1800" spc="-1" strike="noStrike">
+                <a:solidFill>
+                  <a:srgbClr val="000000"/>
+                </a:solidFill>
+                <a:latin typeface="Arial"/>
+              </a:rPr>
+              <a:t>t</a:t>
+            </a:r>
+            <a:r>
+              <a:rPr b="0" lang="en-US" sz="1800" spc="-1" strike="noStrike">
+                <a:solidFill>
+                  <a:srgbClr val="000000"/>
+                </a:solidFill>
+                <a:latin typeface="Arial"/>
+              </a:rPr>
+              <a:t>o</a:t>
+            </a:r>
+            <a:r>
+              <a:rPr b="0" lang="en-US" sz="1800" spc="-1" strike="noStrike">
+                <a:solidFill>
+                  <a:srgbClr val="000000"/>
+                </a:solidFill>
+                <a:latin typeface="Arial"/>
+              </a:rPr>
+              <a:t> </a:t>
+            </a:r>
+            <a:r>
+              <a:rPr b="0" lang="en-US" sz="1800" spc="-1" strike="noStrike">
+                <a:solidFill>
+                  <a:srgbClr val="000000"/>
+                </a:solidFill>
+                <a:latin typeface="Arial"/>
+              </a:rPr>
+              <a:t>e</a:t>
+            </a:r>
+            <a:r>
+              <a:rPr b="0" lang="en-US" sz="1800" spc="-1" strike="noStrike">
+                <a:solidFill>
+                  <a:srgbClr val="000000"/>
+                </a:solidFill>
+                <a:latin typeface="Arial"/>
+              </a:rPr>
+              <a:t>d</a:t>
+            </a:r>
+            <a:r>
+              <a:rPr b="0" lang="en-US" sz="1800" spc="-1" strike="noStrike">
+                <a:solidFill>
+                  <a:srgbClr val="000000"/>
+                </a:solidFill>
+                <a:latin typeface="Arial"/>
+              </a:rPr>
+              <a:t>i</a:t>
+            </a:r>
+            <a:r>
+              <a:rPr b="0" lang="en-US" sz="1800" spc="-1" strike="noStrike">
+                <a:solidFill>
+                  <a:srgbClr val="000000"/>
+                </a:solidFill>
+                <a:latin typeface="Arial"/>
+              </a:rPr>
+              <a:t>t</a:t>
+            </a:r>
+            <a:r>
+              <a:rPr b="0" lang="en-US" sz="1800" spc="-1" strike="noStrike">
+                <a:solidFill>
+                  <a:srgbClr val="000000"/>
+                </a:solidFill>
+                <a:latin typeface="Arial"/>
+              </a:rPr>
+              <a:t> </a:t>
+            </a:r>
+            <a:r>
+              <a:rPr b="0" lang="en-US" sz="1800" spc="-1" strike="noStrike">
+                <a:solidFill>
+                  <a:srgbClr val="000000"/>
+                </a:solidFill>
+                <a:latin typeface="Arial"/>
+              </a:rPr>
+              <a:t>t</a:t>
+            </a:r>
+            <a:r>
+              <a:rPr b="0" lang="en-US" sz="1800" spc="-1" strike="noStrike">
+                <a:solidFill>
+                  <a:srgbClr val="000000"/>
+                </a:solidFill>
+                <a:latin typeface="Arial"/>
+              </a:rPr>
+              <a:t>h</a:t>
+            </a:r>
+            <a:r>
+              <a:rPr b="0" lang="en-US" sz="1800" spc="-1" strike="noStrike">
+                <a:solidFill>
+                  <a:srgbClr val="000000"/>
+                </a:solidFill>
+                <a:latin typeface="Arial"/>
+              </a:rPr>
+              <a:t>e</a:t>
+            </a:r>
+            <a:r>
+              <a:rPr b="0" lang="en-US" sz="1800" spc="-1" strike="noStrike">
+                <a:solidFill>
+                  <a:srgbClr val="000000"/>
+                </a:solidFill>
+                <a:latin typeface="Arial"/>
+              </a:rPr>
+              <a:t> </a:t>
+            </a:r>
+            <a:r>
+              <a:rPr b="0" lang="en-US" sz="1800" spc="-1" strike="noStrike">
+                <a:solidFill>
+                  <a:srgbClr val="000000"/>
+                </a:solidFill>
+                <a:latin typeface="Arial"/>
+              </a:rPr>
+              <a:t>t</a:t>
+            </a:r>
+            <a:r>
+              <a:rPr b="0" lang="en-US" sz="1800" spc="-1" strike="noStrike">
+                <a:solidFill>
+                  <a:srgbClr val="000000"/>
+                </a:solidFill>
+                <a:latin typeface="Arial"/>
+              </a:rPr>
+              <a:t>i</a:t>
+            </a:r>
+            <a:r>
+              <a:rPr b="0" lang="en-US" sz="1800" spc="-1" strike="noStrike">
+                <a:solidFill>
+                  <a:srgbClr val="000000"/>
+                </a:solidFill>
+                <a:latin typeface="Arial"/>
+              </a:rPr>
+              <a:t>t</a:t>
+            </a:r>
+            <a:r>
+              <a:rPr b="0" lang="en-US" sz="1800" spc="-1" strike="noStrike">
+                <a:solidFill>
+                  <a:srgbClr val="000000"/>
+                </a:solidFill>
+                <a:latin typeface="Arial"/>
+              </a:rPr>
+              <a:t>l</a:t>
+            </a:r>
+            <a:r>
+              <a:rPr b="0" lang="en-US" sz="1800" spc="-1" strike="noStrike">
+                <a:solidFill>
+                  <a:srgbClr val="000000"/>
+                </a:solidFill>
+                <a:latin typeface="Arial"/>
+              </a:rPr>
+              <a:t>e</a:t>
+            </a:r>
+            <a:r>
+              <a:rPr b="0" lang="en-US" sz="1800" spc="-1" strike="noStrike">
+                <a:solidFill>
+                  <a:srgbClr val="000000"/>
+                </a:solidFill>
+                <a:latin typeface="Arial"/>
+              </a:rPr>
+              <a:t> </a:t>
+            </a:r>
+            <a:r>
+              <a:rPr b="0" lang="en-US" sz="1800" spc="-1" strike="noStrike">
+                <a:solidFill>
+                  <a:srgbClr val="000000"/>
+                </a:solidFill>
+                <a:latin typeface="Arial"/>
+              </a:rPr>
+              <a:t>t</a:t>
+            </a:r>
+            <a:r>
+              <a:rPr b="0" lang="en-US" sz="1800" spc="-1" strike="noStrike">
+                <a:solidFill>
+                  <a:srgbClr val="000000"/>
+                </a:solidFill>
+                <a:latin typeface="Arial"/>
+              </a:rPr>
+              <a:t>e</a:t>
+            </a:r>
+            <a:r>
+              <a:rPr b="0" lang="en-US" sz="1800" spc="-1" strike="noStrike">
+                <a:solidFill>
+                  <a:srgbClr val="000000"/>
+                </a:solidFill>
+                <a:latin typeface="Arial"/>
+              </a:rPr>
+              <a:t>x</a:t>
+            </a:r>
+            <a:r>
+              <a:rPr b="0" lang="en-US" sz="1800" spc="-1" strike="noStrike">
+                <a:solidFill>
+                  <a:srgbClr val="000000"/>
+                </a:solidFill>
+                <a:latin typeface="Arial"/>
+              </a:rPr>
+              <a:t>t</a:t>
+            </a:r>
+            <a:r>
+              <a:rPr b="0" lang="en-US" sz="1800" spc="-1" strike="noStrike">
+                <a:solidFill>
+                  <a:srgbClr val="000000"/>
+                </a:solidFill>
+                <a:latin typeface="Arial"/>
+              </a:rPr>
+              <a:t> </a:t>
+            </a:r>
+            <a:r>
+              <a:rPr b="0" lang="en-US" sz="1800" spc="-1" strike="noStrike">
+                <a:solidFill>
+                  <a:srgbClr val="000000"/>
+                </a:solidFill>
+                <a:latin typeface="Arial"/>
+              </a:rPr>
+              <a:t>f</a:t>
+            </a:r>
+            <a:r>
+              <a:rPr b="0" lang="en-US" sz="1800" spc="-1" strike="noStrike">
+                <a:solidFill>
+                  <a:srgbClr val="000000"/>
+                </a:solidFill>
+                <a:latin typeface="Arial"/>
+              </a:rPr>
+              <a:t>o</a:t>
+            </a:r>
+            <a:r>
+              <a:rPr b="0" lang="en-US" sz="1800" spc="-1" strike="noStrike">
+                <a:solidFill>
+                  <a:srgbClr val="000000"/>
+                </a:solidFill>
+                <a:latin typeface="Arial"/>
+              </a:rPr>
+              <a:t>r</a:t>
+            </a:r>
+            <a:r>
+              <a:rPr b="0" lang="en-US" sz="1800" spc="-1" strike="noStrike">
+                <a:solidFill>
+                  <a:srgbClr val="000000"/>
+                </a:solidFill>
+                <a:latin typeface="Arial"/>
+              </a:rPr>
+              <a:t>m</a:t>
+            </a:r>
+            <a:r>
+              <a:rPr b="0" lang="en-US" sz="1800" spc="-1" strike="noStrike">
+                <a:solidFill>
+                  <a:srgbClr val="000000"/>
+                </a:solidFill>
+                <a:latin typeface="Arial"/>
+              </a:rPr>
+              <a:t>a</a:t>
+            </a:r>
+            <a:r>
+              <a:rPr b="0" lang="en-US" sz="1800" spc="-1" strike="noStrike">
+                <a:solidFill>
+                  <a:srgbClr val="000000"/>
+                </a:solidFill>
+                <a:latin typeface="Arial"/>
+              </a:rPr>
+              <a:t>t</a:t>
             </a:r>
             <a:endParaRPr b="0" lang="en-US" sz="1800" spc="-1" strike="noStrike">
               <a:solidFill>
@@ -2581,7 +2887,7 @@
                 <a:tab algn="l" pos="0"/>
               </a:tabLst>
             </a:pPr>
-            <a:fld id="{AC77FFC2-4F12-4BE4-9AB2-7603157FF5CF}" type="slidenum">
+            <a:fld id="{CFCEE82B-716D-4E3F-BCE2-02929EF04CFC}" type="slidenum">
               <a:rPr b="0" lang="en-US" sz="2600" spc="-1" strike="noStrike">
                 <a:solidFill>
                   <a:srgbClr val="000000"/>
@@ -3316,7 +3622,7 @@
                 <a:tab algn="l" pos="0"/>
               </a:tabLst>
             </a:pPr>
-            <a:fld id="{EE961093-52A6-4F07-B76D-FADBFD7EAAA2}" type="slidenum">
+            <a:fld id="{4D9FAE66-B0BE-4C04-8CCD-0DEFF82ACD96}" type="slidenum">
               <a:rPr b="0" lang="en-US" sz="2600" spc="-1" strike="noStrike">
                 <a:solidFill>
                   <a:srgbClr val="000000"/>
@@ -4406,7 +4712,7 @@
                 <a:tab algn="l" pos="0"/>
               </a:tabLst>
             </a:pPr>
-            <a:fld id="{D0572EB1-6A5F-4767-A2D8-369F219D8305}" type="slidenum">
+            <a:fld id="{8520B6FF-50B7-4137-A883-589FC23C89C5}" type="slidenum">
               <a:rPr b="0" lang="en-US" sz="2600" spc="-1" strike="noStrike">
                 <a:solidFill>
                   <a:srgbClr val="000000"/>
@@ -4615,7 +4921,7 @@
               <a:buFont typeface="Wingdings" charset="2"/>
               <a:buChar char=""/>
             </a:pPr>
-            <a:fld id="{29B1648A-B5BA-4F31-9EBB-562F5A82DCEB}" type="author">
+            <a:fld id="{C4BBA330-84A7-4404-96B9-DA97A333325F}" type="author">
               <a:rPr b="0" lang="en-US" sz="3200" spc="-1" strike="noStrike">
                 <a:solidFill>
                   <a:srgbClr val="000000"/>
@@ -4733,50 +5039,7 @@
       </p:sp>
       <p:sp>
         <p:nvSpPr>
-          <p:cNvPr id="54" name="PlaceHolder 2"/>
-          <p:cNvSpPr>
-            <a:spLocks noGrp="1"/>
-          </p:cNvSpPr>
-          <p:nvPr>
-            <p:ph/>
-          </p:nvPr>
-        </p:nvSpPr>
-        <p:spPr>
-          <a:xfrm>
-            <a:off x="503280" y="1515240"/>
-            <a:ext cx="8869680" cy="3288240"/>
-          </a:xfrm>
-          <a:prstGeom prst="rect">
-            <a:avLst/>
-          </a:prstGeom>
-          <a:noFill/>
-          <a:ln w="0">
-            <a:noFill/>
-          </a:ln>
-        </p:spPr>
-        <p:txBody>
-          <a:bodyPr lIns="0" rIns="0" tIns="0" bIns="0" anchor="t">
-            <a:normAutofit/>
-          </a:bodyPr>
-          <a:p>
-            <a:pPr indent="0">
-              <a:spcBef>
-                <a:spcPts val="1417"/>
-              </a:spcBef>
-              <a:buNone/>
-            </a:pPr>
-            <a:endParaRPr b="0" lang="en-US" sz="1800" spc="-1" strike="noStrike">
-              <a:solidFill>
-                <a:srgbClr val="000000"/>
-              </a:solidFill>
-              <a:latin typeface="Arial"/>
-            </a:endParaRPr>
-          </a:p>
-        </p:txBody>
-      </p:sp>
-      <p:sp>
-        <p:nvSpPr>
-          <p:cNvPr id="4" name="PlaceHolder 3"/>
+          <p:cNvPr id="3" name="PlaceHolder 2"/>
           <p:cNvSpPr>
             <a:spLocks noGrp="1"/>
           </p:cNvSpPr>
@@ -4788,7 +5051,7 @@
         <p:txBody>
           <a:bodyPr/>
           <a:p>
-            <a:fld id="{10EC059C-F7B4-427D-B0DD-13AC9B678473}" type="slidenum">
+            <a:fld id="{92C57882-871D-432F-8E59-2090DCCCD09C}" type="slidenum">
               <a:t>2</a:t>
             </a:fld>
           </a:p>
@@ -4830,7 +5093,7 @@
       </p:grpSpPr>
       <p:sp>
         <p:nvSpPr>
-          <p:cNvPr id="55" name="PlaceHolder 1"/>
+          <p:cNvPr id="54" name="PlaceHolder 1"/>
           <p:cNvSpPr>
             <a:spLocks noGrp="1"/>
           </p:cNvSpPr>
@@ -4883,52 +5146,32 @@
           </a:p>
         </p:txBody>
       </p:sp>
-      <p:sp>
-        <p:nvSpPr>
-          <p:cNvPr id="56" name="PlaceHolder 2"/>
-          <p:cNvSpPr>
-            <a:spLocks noGrp="1"/>
-          </p:cNvSpPr>
-          <p:nvPr>
-            <p:ph/>
-          </p:nvPr>
-        </p:nvSpPr>
+      <p:pic>
+        <p:nvPicPr>
+          <p:cNvPr id="55" name="" descr=""/>
+          <p:cNvPicPr/>
+          <p:nvPr/>
+        </p:nvPicPr>
+        <p:blipFill>
+          <a:blip r:embed="rId1"/>
+          <a:stretch/>
+        </p:blipFill>
         <p:spPr>
           <a:xfrm>
-            <a:off x="503640" y="1785240"/>
-            <a:ext cx="8869680" cy="3288240"/>
+            <a:off x="432000" y="2057400"/>
+            <a:ext cx="5511600" cy="2158560"/>
           </a:xfrm>
           <a:prstGeom prst="rect">
             <a:avLst/>
           </a:prstGeom>
-          <a:noFill/>
           <a:ln w="0">
             <a:noFill/>
           </a:ln>
         </p:spPr>
-        <p:txBody>
-          <a:bodyPr lIns="0" rIns="0" tIns="0" bIns="0" anchor="t">
-            <a:normAutofit/>
-          </a:bodyPr>
-          <a:p>
-            <a:pPr indent="0">
-              <a:spcBef>
-                <a:spcPts val="1417"/>
-              </a:spcBef>
-              <a:buNone/>
-            </a:pPr>
-            <a:endParaRPr b="0" lang="en-US" sz="1800" spc="-1" strike="noStrike">
-              <a:solidFill>
-                <a:srgbClr val="000000"/>
-              </a:solidFill>
-              <a:latin typeface="Arial"/>
-            </a:endParaRPr>
-          </a:p>
-        </p:txBody>
-      </p:sp>
-      <p:sp>
-        <p:nvSpPr>
-          <p:cNvPr id="4" name="PlaceHolder 3"/>
+      </p:pic>
+      <p:sp>
+        <p:nvSpPr>
+          <p:cNvPr id="3" name="PlaceHolder 2"/>
           <p:cNvSpPr>
             <a:spLocks noGrp="1"/>
           </p:cNvSpPr>
@@ -4940,7 +5183,7 @@
         <p:txBody>
           <a:bodyPr/>
           <a:p>
-            <a:fld id="{B377A0B0-63B1-481D-915A-D7BE192101D6}" type="slidenum">
+            <a:fld id="{74EE4919-94D8-4354-B725-653B0B547CCD}" type="slidenum">
               <a:t>3</a:t>
             </a:fld>
           </a:p>
@@ -4982,7 +5225,7 @@
       </p:grpSpPr>
       <p:sp>
         <p:nvSpPr>
-          <p:cNvPr id="57" name="PlaceHolder 1"/>
+          <p:cNvPr id="56" name="PlaceHolder 1"/>
           <p:cNvSpPr>
             <a:spLocks noGrp="1"/>
           </p:cNvSpPr>
@@ -5037,7 +5280,7 @@
       </p:sp>
       <p:sp>
         <p:nvSpPr>
-          <p:cNvPr id="58" name="PlaceHolder 2"/>
+          <p:cNvPr id="57" name="PlaceHolder 2"/>
           <p:cNvSpPr>
             <a:spLocks noGrp="1"/>
           </p:cNvSpPr>
@@ -5080,7 +5323,7 @@
       </p:sp>
       <p:pic>
         <p:nvPicPr>
-          <p:cNvPr id="59" name="" descr=""/>
+          <p:cNvPr id="58" name="" descr=""/>
           <p:cNvPicPr/>
           <p:nvPr/>
         </p:nvPicPr>
@@ -5115,7 +5358,7 @@
         <p:txBody>
           <a:bodyPr/>
           <a:p>
-            <a:fld id="{BC70CC3A-3746-4837-92F6-0908520305DD}" type="slidenum">
+            <a:fld id="{32C8334D-2043-4A8A-B476-518A2D280B38}" type="slidenum">
               <a:t>4</a:t>
             </a:fld>
           </a:p>
@@ -5157,7 +5400,7 @@
       </p:grpSpPr>
       <p:sp>
         <p:nvSpPr>
-          <p:cNvPr id="60" name="PlaceHolder 1"/>
+          <p:cNvPr id="59" name="PlaceHolder 1"/>
           <p:cNvSpPr>
             <a:spLocks noGrp="1"/>
           </p:cNvSpPr>
@@ -5210,52 +5453,9 @@
           </a:p>
         </p:txBody>
       </p:sp>
-      <p:sp>
-        <p:nvSpPr>
-          <p:cNvPr id="61" name="PlaceHolder 2"/>
-          <p:cNvSpPr>
-            <a:spLocks noGrp="1"/>
-          </p:cNvSpPr>
-          <p:nvPr>
-            <p:ph/>
-          </p:nvPr>
-        </p:nvSpPr>
-        <p:spPr>
-          <a:xfrm>
-            <a:off x="503640" y="1785240"/>
-            <a:ext cx="8869680" cy="3288240"/>
-          </a:xfrm>
-          <a:prstGeom prst="rect">
-            <a:avLst/>
-          </a:prstGeom>
-          <a:noFill/>
-          <a:ln w="0">
-            <a:noFill/>
-          </a:ln>
-        </p:spPr>
-        <p:txBody>
-          <a:bodyPr lIns="0" rIns="0" tIns="0" bIns="0" anchor="t">
-            <a:normAutofit/>
-          </a:bodyPr>
-          <a:p>
-            <a:pPr indent="0">
-              <a:spcBef>
-                <a:spcPts val="1417"/>
-              </a:spcBef>
-              <a:buNone/>
-            </a:pPr>
-            <a:endParaRPr b="0" lang="en-US" sz="1800" spc="-1" strike="noStrike">
-              <a:solidFill>
-                <a:srgbClr val="000000"/>
-              </a:solidFill>
-              <a:latin typeface="Arial"/>
-            </a:endParaRPr>
-          </a:p>
-        </p:txBody>
-      </p:sp>
       <p:pic>
         <p:nvPicPr>
-          <p:cNvPr id="62" name="" descr=""/>
+          <p:cNvPr id="60" name="" descr=""/>
           <p:cNvPicPr/>
           <p:nvPr/>
         </p:nvPicPr>
@@ -5278,7 +5478,7 @@
       </p:pic>
       <p:sp>
         <p:nvSpPr>
-          <p:cNvPr id="4" name="PlaceHolder 3"/>
+          <p:cNvPr id="3" name="PlaceHolder 2"/>
           <p:cNvSpPr>
             <a:spLocks noGrp="1"/>
           </p:cNvSpPr>
@@ -5290,7 +5490,7 @@
         <p:txBody>
           <a:bodyPr/>
           <a:p>
-            <a:fld id="{BDE73CA0-5218-4B0D-8116-705105A4231F}" type="slidenum">
+            <a:fld id="{777B95FD-79C3-4B2C-9CCD-B41F1379664B}" type="slidenum">
               <a:t>5</a:t>
             </a:fld>
           </a:p>
@@ -5332,7 +5532,7 @@
       </p:grpSpPr>
       <p:sp>
         <p:nvSpPr>
-          <p:cNvPr id="63" name="PlaceHolder 1"/>
+          <p:cNvPr id="61" name="PlaceHolder 1"/>
           <p:cNvSpPr>
             <a:spLocks noGrp="1"/>
           </p:cNvSpPr>
@@ -5387,7 +5587,7 @@
       </p:sp>
       <p:pic>
         <p:nvPicPr>
-          <p:cNvPr id="64" name="" descr=""/>
+          <p:cNvPr id="62" name="" descr=""/>
           <p:cNvPicPr/>
           <p:nvPr/>
         </p:nvPicPr>
@@ -5422,7 +5622,7 @@
         <p:txBody>
           <a:bodyPr/>
           <a:p>
-            <a:fld id="{AD1EF43A-411E-4464-AF08-E99A97A69ED9}" type="slidenum">
+            <a:fld id="{92C6404F-8158-4DE0-B16E-B9E7B51F88DE}" type="slidenum">
               <a:t>6</a:t>
             </a:fld>
           </a:p>
@@ -5464,7 +5664,7 @@
       </p:grpSpPr>
       <p:sp>
         <p:nvSpPr>
-          <p:cNvPr id="65" name="PlaceHolder 1"/>
+          <p:cNvPr id="63" name="PlaceHolder 1"/>
           <p:cNvSpPr>
             <a:spLocks noGrp="1"/>
           </p:cNvSpPr>
@@ -5519,7 +5719,7 @@
       </p:sp>
       <p:pic>
         <p:nvPicPr>
-          <p:cNvPr id="66" name="" descr=""/>
+          <p:cNvPr id="64" name="" descr=""/>
           <p:cNvPicPr/>
           <p:nvPr/>
         </p:nvPicPr>
@@ -5554,7 +5754,7 @@
         <p:txBody>
           <a:bodyPr/>
           <a:p>
-            <a:fld id="{FC06F6B3-7163-42C9-9D76-B3C3549EA99E}" type="slidenum">
+            <a:fld id="{66F64BCD-A96C-4854-A105-C1E181CD8ECD}" type="slidenum">
               <a:t>7</a:t>
             </a:fld>
           </a:p>
@@ -5596,7 +5796,7 @@
       </p:grpSpPr>
       <p:sp>
         <p:nvSpPr>
-          <p:cNvPr id="67" name="PlaceHolder 1"/>
+          <p:cNvPr id="65" name="PlaceHolder 1"/>
           <p:cNvSpPr>
             <a:spLocks noGrp="1"/>
           </p:cNvSpPr>
@@ -5651,50 +5851,7 @@
       </p:sp>
       <p:sp>
         <p:nvSpPr>
-          <p:cNvPr id="68" name="PlaceHolder 2"/>
-          <p:cNvSpPr>
-            <a:spLocks noGrp="1"/>
-          </p:cNvSpPr>
-          <p:nvPr>
-            <p:ph/>
-          </p:nvPr>
-        </p:nvSpPr>
-        <p:spPr>
-          <a:xfrm>
-            <a:off x="503640" y="1785240"/>
-            <a:ext cx="8869680" cy="3288240"/>
-          </a:xfrm>
-          <a:prstGeom prst="rect">
-            <a:avLst/>
-          </a:prstGeom>
-          <a:noFill/>
-          <a:ln w="0">
-            <a:noFill/>
-          </a:ln>
-        </p:spPr>
-        <p:txBody>
-          <a:bodyPr lIns="0" rIns="0" tIns="0" bIns="0" anchor="t">
-            <a:normAutofit/>
-          </a:bodyPr>
-          <a:p>
-            <a:pPr indent="0">
-              <a:spcBef>
-                <a:spcPts val="1417"/>
-              </a:spcBef>
-              <a:buNone/>
-            </a:pPr>
-            <a:endParaRPr b="0" lang="en-US" sz="1800" spc="-1" strike="noStrike">
-              <a:solidFill>
-                <a:srgbClr val="000000"/>
-              </a:solidFill>
-              <a:latin typeface="Arial"/>
-            </a:endParaRPr>
-          </a:p>
-        </p:txBody>
-      </p:sp>
-      <p:sp>
-        <p:nvSpPr>
-          <p:cNvPr id="4" name="PlaceHolder 3"/>
+          <p:cNvPr id="3" name="PlaceHolder 2"/>
           <p:cNvSpPr>
             <a:spLocks noGrp="1"/>
           </p:cNvSpPr>
@@ -5706,7 +5863,7 @@
         <p:txBody>
           <a:bodyPr/>
           <a:p>
-            <a:fld id="{62F46D99-855A-4C92-887D-72D26FAA5D16}" type="slidenum">
+            <a:fld id="{23DEB50F-511B-4E45-BA92-4B801F4A9CD9}" type="slidenum">
               <a:t>8</a:t>
             </a:fld>
           </a:p>
@@ -5748,7 +5905,7 @@
       </p:grpSpPr>
       <p:sp>
         <p:nvSpPr>
-          <p:cNvPr id="69" name="PlaceHolder 1"/>
+          <p:cNvPr id="66" name="PlaceHolder 1"/>
           <p:cNvSpPr>
             <a:spLocks noGrp="1"/>
           </p:cNvSpPr>
@@ -5803,7 +5960,7 @@
       </p:sp>
       <p:sp>
         <p:nvSpPr>
-          <p:cNvPr id="70" name=""/>
+          <p:cNvPr id="67" name=""/>
           <p:cNvSpPr/>
           <p:nvPr/>
         </p:nvSpPr>
@@ -5842,7 +5999,7 @@
               <a:buFont typeface="Wingdings" charset="2"/>
               <a:buChar char=""/>
             </a:pPr>
-            <a:fld id="{39F3C02E-D0C5-4035-B8FF-BF8E9BDE5A71}" type="author">
+            <a:fld id="{13D88A6D-A239-4A27-8EAC-0860C7CC923A}" type="author">
               <a:rPr b="0" lang="en-US" sz="2400" spc="-1" strike="noStrike">
                 <a:solidFill>
                   <a:srgbClr val="000000"/>

</xml_diff>

<commit_message>
Implemented QuestionParser tests, not all work tho.
</commit_message>
<xml_diff>
--- a/beta.pptx
+++ b/beta.pptx
@@ -54,7 +54,7 @@
         <p:spPr>
           <a:xfrm>
             <a:off x="466200" y="3247560"/>
-            <a:ext cx="9001440" cy="953640"/>
+            <a:ext cx="9001080" cy="953280"/>
           </a:xfrm>
           <a:prstGeom prst="rect">
             <a:avLst/>
@@ -158,7 +158,7 @@
         <p:txBody>
           <a:bodyPr/>
           <a:p>
-            <a:fld id="{10217B84-3824-4A9A-BC80-731965417621}" type="slidenum">
+            <a:fld id="{25B15E70-3EF9-402F-8089-0FBCF0897B61}" type="slidenum">
               <a:t>&lt;#&gt;</a:t>
             </a:fld>
           </a:p>
@@ -220,7 +220,7 @@
         <p:spPr>
           <a:xfrm>
             <a:off x="466200" y="3247560"/>
-            <a:ext cx="9001440" cy="953640"/>
+            <a:ext cx="9001080" cy="953280"/>
           </a:xfrm>
           <a:prstGeom prst="rect">
             <a:avLst/>
@@ -321,7 +321,7 @@
         <p:txBody>
           <a:bodyPr/>
           <a:p>
-            <a:fld id="{2D6CDAC5-CAB9-4305-8962-AF0CE2CC0A2A}" type="slidenum">
+            <a:fld id="{879B8E0D-E8C4-4330-89DF-4FB47A75AE3D}" type="slidenum">
               <a:t>&lt;#&gt;</a:t>
             </a:fld>
           </a:p>
@@ -383,7 +383,7 @@
         <p:spPr>
           <a:xfrm>
             <a:off x="466200" y="3247560"/>
-            <a:ext cx="9001440" cy="953640"/>
+            <a:ext cx="9001080" cy="953280"/>
           </a:xfrm>
           <a:prstGeom prst="rect">
             <a:avLst/>
@@ -487,7 +487,7 @@
         <p:txBody>
           <a:bodyPr/>
           <a:p>
-            <a:fld id="{39E8F91C-0D66-439F-AAFA-7866356D7E37}" type="slidenum">
+            <a:fld id="{5426EA62-CF3C-4CCB-9F7B-995ECC833232}" type="slidenum">
               <a:t>&lt;#&gt;</a:t>
             </a:fld>
           </a:p>
@@ -549,7 +549,7 @@
         <p:spPr>
           <a:xfrm>
             <a:off x="466200" y="3247560"/>
-            <a:ext cx="9001440" cy="953640"/>
+            <a:ext cx="9001080" cy="953280"/>
           </a:xfrm>
           <a:prstGeom prst="rect">
             <a:avLst/>
@@ -653,7 +653,7 @@
         <p:txBody>
           <a:bodyPr/>
           <a:p>
-            <a:fld id="{9F741934-4BA5-4A96-9682-8A7AB2F89FD9}" type="slidenum">
+            <a:fld id="{142AF100-FB03-4029-BE40-6DE4BCFC697C}" type="slidenum">
               <a:t>&lt;#&gt;</a:t>
             </a:fld>
           </a:p>
@@ -715,7 +715,7 @@
         <p:spPr>
           <a:xfrm>
             <a:off x="466200" y="3247560"/>
-            <a:ext cx="9001440" cy="953640"/>
+            <a:ext cx="9001080" cy="953280"/>
           </a:xfrm>
           <a:prstGeom prst="rect">
             <a:avLst/>
@@ -819,7 +819,7 @@
         <p:txBody>
           <a:bodyPr/>
           <a:p>
-            <a:fld id="{6F6B1267-FB13-4069-85CA-982D86BC0673}" type="slidenum">
+            <a:fld id="{6FB1B23A-550C-4712-80A9-A762A4D72073}" type="slidenum">
               <a:t>&lt;#&gt;</a:t>
             </a:fld>
           </a:p>
@@ -877,15 +877,15 @@
         <p:spPr>
           <a:xfrm>
             <a:off x="0" y="0"/>
-            <a:ext cx="10080000" cy="4251600"/>
+            <a:ext cx="10079640" cy="4251240"/>
           </a:xfrm>
           <a:custGeom>
             <a:avLst/>
             <a:gdLst>
-              <a:gd name="textAreaLeft" fmla="*/ 0 w 10080000"/>
-              <a:gd name="textAreaRight" fmla="*/ 10080360 w 10080000"/>
-              <a:gd name="textAreaTop" fmla="*/ 0 h 4251600"/>
-              <a:gd name="textAreaBottom" fmla="*/ 4251960 h 4251600"/>
+              <a:gd name="textAreaLeft" fmla="*/ 0 w 10079640"/>
+              <a:gd name="textAreaRight" fmla="*/ 10080360 w 10079640"/>
+              <a:gd name="textAreaTop" fmla="*/ 0 h 4251240"/>
+              <a:gd name="textAreaBottom" fmla="*/ 4251960 h 4251240"/>
             </a:gdLst>
             <a:ahLst/>
             <a:rect l="textAreaLeft" t="textAreaTop" r="textAreaRight" b="textAreaBottom"/>
@@ -941,6 +941,7 @@
                 <a:srgbClr val="000000"/>
               </a:solidFill>
               <a:latin typeface="Arial"/>
+              <a:ea typeface="DejaVu Sans"/>
             </a:endParaRPr>
           </a:p>
         </p:txBody>
@@ -958,7 +959,7 @@
         <p:spPr>
           <a:xfrm>
             <a:off x="466200" y="3247560"/>
-            <a:ext cx="9001440" cy="953640"/>
+            <a:ext cx="9001080" cy="953280"/>
           </a:xfrm>
           <a:prstGeom prst="rect">
             <a:avLst/>
@@ -1006,8 +1007,8 @@
         </p:nvSpPr>
         <p:spPr>
           <a:xfrm>
-            <a:off x="272520" y="4246560"/>
-            <a:ext cx="8801640" cy="3313800"/>
+            <a:off x="504000" y="1326600"/>
+            <a:ext cx="9071640" cy="3288240"/>
           </a:xfrm>
           <a:prstGeom prst="rect">
             <a:avLst/>
@@ -1232,7 +1233,7 @@
         <p:spPr>
           <a:xfrm>
             <a:off x="5579640" y="5129640"/>
-            <a:ext cx="4319640" cy="390960"/>
+            <a:ext cx="4319280" cy="390600"/>
           </a:xfrm>
           <a:prstGeom prst="rect">
             <a:avLst/>
@@ -1304,7 +1305,7 @@
         <p:spPr>
           <a:xfrm>
             <a:off x="7379640" y="4589640"/>
-            <a:ext cx="2519640" cy="390960"/>
+            <a:ext cx="2519280" cy="390600"/>
           </a:xfrm>
           <a:prstGeom prst="rect">
             <a:avLst/>
@@ -1345,7 +1346,7 @@
                 <a:tab algn="l" pos="0"/>
               </a:tabLst>
             </a:pPr>
-            <a:fld id="{74757FF5-7C24-4218-A0CE-5B4DCCEF9B96}" type="slidenum">
+            <a:fld id="{D4182A84-72D3-4356-9AC7-694B03769199}" type="slidenum">
               <a:rPr b="0" lang="en-US" sz="2600" spc="-1" strike="noStrike">
                 <a:solidFill>
                   <a:srgbClr val="000000"/>
@@ -1376,7 +1377,7 @@
         <p:spPr>
           <a:xfrm>
             <a:off x="7019640" y="4913640"/>
-            <a:ext cx="2879640" cy="390960"/>
+            <a:ext cx="2879280" cy="390600"/>
           </a:xfrm>
           <a:prstGeom prst="rect">
             <a:avLst/>
@@ -1458,15 +1459,15 @@
         <p:spPr>
           <a:xfrm>
             <a:off x="0" y="0"/>
-            <a:ext cx="10080000" cy="4251600"/>
+            <a:ext cx="10079640" cy="4251240"/>
           </a:xfrm>
           <a:custGeom>
             <a:avLst/>
             <a:gdLst>
-              <a:gd name="textAreaLeft" fmla="*/ 0 w 10080000"/>
-              <a:gd name="textAreaRight" fmla="*/ 10080360 w 10080000"/>
-              <a:gd name="textAreaTop" fmla="*/ 0 h 4251600"/>
-              <a:gd name="textAreaBottom" fmla="*/ 4251960 h 4251600"/>
+              <a:gd name="textAreaLeft" fmla="*/ 0 w 10079640"/>
+              <a:gd name="textAreaRight" fmla="*/ 10080360 w 10079640"/>
+              <a:gd name="textAreaTop" fmla="*/ 0 h 4251240"/>
+              <a:gd name="textAreaBottom" fmla="*/ 4251960 h 4251240"/>
             </a:gdLst>
             <a:ahLst/>
             <a:rect l="textAreaLeft" t="textAreaTop" r="textAreaRight" b="textAreaBottom"/>
@@ -1522,6 +1523,7 @@
                 <a:srgbClr val="000000"/>
               </a:solidFill>
               <a:latin typeface="Arial"/>
+              <a:ea typeface="DejaVu Sans"/>
             </a:endParaRPr>
           </a:p>
         </p:txBody>
@@ -1539,7 +1541,7 @@
         <p:spPr>
           <a:xfrm>
             <a:off x="466200" y="3247560"/>
-            <a:ext cx="9001440" cy="953640"/>
+            <a:ext cx="9001080" cy="953280"/>
           </a:xfrm>
           <a:prstGeom prst="rect">
             <a:avLst/>
@@ -1588,7 +1590,7 @@
         <p:spPr>
           <a:xfrm>
             <a:off x="5579640" y="5129640"/>
-            <a:ext cx="4319640" cy="390960"/>
+            <a:ext cx="4319280" cy="390600"/>
           </a:xfrm>
           <a:prstGeom prst="rect">
             <a:avLst/>
@@ -1660,7 +1662,7 @@
         <p:spPr>
           <a:xfrm>
             <a:off x="7379640" y="4589640"/>
-            <a:ext cx="2519640" cy="390960"/>
+            <a:ext cx="2519280" cy="390600"/>
           </a:xfrm>
           <a:prstGeom prst="rect">
             <a:avLst/>
@@ -1701,7 +1703,7 @@
                 <a:tab algn="l" pos="0"/>
               </a:tabLst>
             </a:pPr>
-            <a:fld id="{78CE374C-C514-4E80-AFF6-A00F78700478}" type="slidenum">
+            <a:fld id="{60043AEF-E930-499F-B291-D91C3810D511}" type="slidenum">
               <a:rPr b="0" lang="en-US" sz="2600" spc="-1" strike="noStrike">
                 <a:solidFill>
                   <a:srgbClr val="000000"/>
@@ -1732,7 +1734,7 @@
         <p:spPr>
           <a:xfrm>
             <a:off x="7019640" y="4913640"/>
-            <a:ext cx="2879640" cy="390960"/>
+            <a:ext cx="2879280" cy="390600"/>
           </a:xfrm>
           <a:prstGeom prst="rect">
             <a:avLst/>
@@ -2039,15 +2041,15 @@
         <p:spPr>
           <a:xfrm>
             <a:off x="1096920" y="4388760"/>
-            <a:ext cx="8982360" cy="1280520"/>
+            <a:ext cx="8982000" cy="1280160"/>
           </a:xfrm>
           <a:custGeom>
             <a:avLst/>
             <a:gdLst>
-              <a:gd name="textAreaLeft" fmla="*/ 0 w 8982360"/>
-              <a:gd name="textAreaRight" fmla="*/ 8982720 w 8982360"/>
-              <a:gd name="textAreaTop" fmla="*/ 0 h 1280520"/>
-              <a:gd name="textAreaBottom" fmla="*/ 1280880 h 1280520"/>
+              <a:gd name="textAreaLeft" fmla="*/ 0 w 8982000"/>
+              <a:gd name="textAreaRight" fmla="*/ 8982720 w 8982000"/>
+              <a:gd name="textAreaTop" fmla="*/ 0 h 1280160"/>
+              <a:gd name="textAreaBottom" fmla="*/ 1280880 h 1280160"/>
             </a:gdLst>
             <a:ahLst/>
             <a:rect l="textAreaLeft" t="textAreaTop" r="textAreaRight" b="textAreaBottom"/>
@@ -2100,6 +2102,7 @@
                 <a:srgbClr val="000000"/>
               </a:solidFill>
               <a:latin typeface="Arial"/>
+              <a:ea typeface="DejaVu Sans"/>
             </a:endParaRPr>
           </a:p>
         </p:txBody>
@@ -2113,15 +2116,15 @@
         <p:spPr>
           <a:xfrm>
             <a:off x="0" y="0"/>
-            <a:ext cx="10079640" cy="1508760"/>
+            <a:ext cx="10079280" cy="1508400"/>
           </a:xfrm>
           <a:custGeom>
             <a:avLst/>
             <a:gdLst>
-              <a:gd name="textAreaLeft" fmla="*/ 0 w 10079640"/>
-              <a:gd name="textAreaRight" fmla="*/ 10080000 w 10079640"/>
-              <a:gd name="textAreaTop" fmla="*/ 0 h 1508760"/>
-              <a:gd name="textAreaBottom" fmla="*/ 1509120 h 1508760"/>
+              <a:gd name="textAreaLeft" fmla="*/ 0 w 10079280"/>
+              <a:gd name="textAreaRight" fmla="*/ 10080000 w 10079280"/>
+              <a:gd name="textAreaTop" fmla="*/ 0 h 1508400"/>
+              <a:gd name="textAreaBottom" fmla="*/ 1509120 h 1508400"/>
             </a:gdLst>
             <a:ahLst/>
             <a:rect l="textAreaLeft" t="textAreaTop" r="textAreaRight" b="textAreaBottom"/>
@@ -2177,6 +2180,7 @@
                 <a:srgbClr val="000000"/>
               </a:solidFill>
               <a:latin typeface="Arial"/>
+              <a:ea typeface="DejaVu Sans"/>
             </a:endParaRPr>
           </a:p>
         </p:txBody>
@@ -2194,7 +2198,7 @@
         <p:spPr>
           <a:xfrm>
             <a:off x="466200" y="3247560"/>
-            <a:ext cx="9001440" cy="953640"/>
+            <a:ext cx="9001080" cy="953280"/>
           </a:xfrm>
           <a:prstGeom prst="rect">
             <a:avLst/>
@@ -2219,313 +2223,7 @@
                 </a:solidFill>
                 <a:latin typeface="Arial"/>
               </a:rPr>
-              <a:t>C</a:t>
-            </a:r>
-            <a:r>
-              <a:rPr b="0" lang="en-US" sz="1800" spc="-1" strike="noStrike">
-                <a:solidFill>
-                  <a:srgbClr val="000000"/>
-                </a:solidFill>
-                <a:latin typeface="Arial"/>
-              </a:rPr>
-              <a:t>l</a:t>
-            </a:r>
-            <a:r>
-              <a:rPr b="0" lang="en-US" sz="1800" spc="-1" strike="noStrike">
-                <a:solidFill>
-                  <a:srgbClr val="000000"/>
-                </a:solidFill>
-                <a:latin typeface="Arial"/>
-              </a:rPr>
-              <a:t>i</a:t>
-            </a:r>
-            <a:r>
-              <a:rPr b="0" lang="en-US" sz="1800" spc="-1" strike="noStrike">
-                <a:solidFill>
-                  <a:srgbClr val="000000"/>
-                </a:solidFill>
-                <a:latin typeface="Arial"/>
-              </a:rPr>
-              <a:t>c</a:t>
-            </a:r>
-            <a:r>
-              <a:rPr b="0" lang="en-US" sz="1800" spc="-1" strike="noStrike">
-                <a:solidFill>
-                  <a:srgbClr val="000000"/>
-                </a:solidFill>
-                <a:latin typeface="Arial"/>
-              </a:rPr>
-              <a:t>k</a:t>
-            </a:r>
-            <a:r>
-              <a:rPr b="0" lang="en-US" sz="1800" spc="-1" strike="noStrike">
-                <a:solidFill>
-                  <a:srgbClr val="000000"/>
-                </a:solidFill>
-                <a:latin typeface="Arial"/>
-              </a:rPr>
-              <a:t> </a:t>
-            </a:r>
-            <a:r>
-              <a:rPr b="0" lang="en-US" sz="1800" spc="-1" strike="noStrike">
-                <a:solidFill>
-                  <a:srgbClr val="000000"/>
-                </a:solidFill>
-                <a:latin typeface="Arial"/>
-              </a:rPr>
-              <a:t>t</a:t>
-            </a:r>
-            <a:r>
-              <a:rPr b="0" lang="en-US" sz="1800" spc="-1" strike="noStrike">
-                <a:solidFill>
-                  <a:srgbClr val="000000"/>
-                </a:solidFill>
-                <a:latin typeface="Arial"/>
-              </a:rPr>
-              <a:t>o</a:t>
-            </a:r>
-            <a:r>
-              <a:rPr b="0" lang="en-US" sz="1800" spc="-1" strike="noStrike">
-                <a:solidFill>
-                  <a:srgbClr val="000000"/>
-                </a:solidFill>
-                <a:latin typeface="Arial"/>
-              </a:rPr>
-              <a:t> </a:t>
-            </a:r>
-            <a:r>
-              <a:rPr b="0" lang="en-US" sz="1800" spc="-1" strike="noStrike">
-                <a:solidFill>
-                  <a:srgbClr val="000000"/>
-                </a:solidFill>
-                <a:latin typeface="Arial"/>
-              </a:rPr>
-              <a:t>e</a:t>
-            </a:r>
-            <a:r>
-              <a:rPr b="0" lang="en-US" sz="1800" spc="-1" strike="noStrike">
-                <a:solidFill>
-                  <a:srgbClr val="000000"/>
-                </a:solidFill>
-                <a:latin typeface="Arial"/>
-              </a:rPr>
-              <a:t>d</a:t>
-            </a:r>
-            <a:r>
-              <a:rPr b="0" lang="en-US" sz="1800" spc="-1" strike="noStrike">
-                <a:solidFill>
-                  <a:srgbClr val="000000"/>
-                </a:solidFill>
-                <a:latin typeface="Arial"/>
-              </a:rPr>
-              <a:t>i</a:t>
-            </a:r>
-            <a:r>
-              <a:rPr b="0" lang="en-US" sz="1800" spc="-1" strike="noStrike">
-                <a:solidFill>
-                  <a:srgbClr val="000000"/>
-                </a:solidFill>
-                <a:latin typeface="Arial"/>
-              </a:rPr>
-              <a:t>t</a:t>
-            </a:r>
-            <a:r>
-              <a:rPr b="0" lang="en-US" sz="1800" spc="-1" strike="noStrike">
-                <a:solidFill>
-                  <a:srgbClr val="000000"/>
-                </a:solidFill>
-                <a:latin typeface="Arial"/>
-              </a:rPr>
-              <a:t> </a:t>
-            </a:r>
-            <a:r>
-              <a:rPr b="0" lang="en-US" sz="1800" spc="-1" strike="noStrike">
-                <a:solidFill>
-                  <a:srgbClr val="000000"/>
-                </a:solidFill>
-                <a:latin typeface="Arial"/>
-              </a:rPr>
-              <a:t>t</a:t>
-            </a:r>
-            <a:r>
-              <a:rPr b="0" lang="en-US" sz="1800" spc="-1" strike="noStrike">
-                <a:solidFill>
-                  <a:srgbClr val="000000"/>
-                </a:solidFill>
-                <a:latin typeface="Arial"/>
-              </a:rPr>
-              <a:t>h</a:t>
-            </a:r>
-            <a:r>
-              <a:rPr b="0" lang="en-US" sz="1800" spc="-1" strike="noStrike">
-                <a:solidFill>
-                  <a:srgbClr val="000000"/>
-                </a:solidFill>
-                <a:latin typeface="Arial"/>
-              </a:rPr>
-              <a:t>e</a:t>
-            </a:r>
-            <a:r>
-              <a:rPr b="0" lang="en-US" sz="1800" spc="-1" strike="noStrike">
-                <a:solidFill>
-                  <a:srgbClr val="000000"/>
-                </a:solidFill>
-                <a:latin typeface="Arial"/>
-              </a:rPr>
-              <a:t> </a:t>
-            </a:r>
-            <a:r>
-              <a:rPr b="0" lang="en-US" sz="1800" spc="-1" strike="noStrike">
-                <a:solidFill>
-                  <a:srgbClr val="000000"/>
-                </a:solidFill>
-                <a:latin typeface="Arial"/>
-              </a:rPr>
-              <a:t>t</a:t>
-            </a:r>
-            <a:r>
-              <a:rPr b="0" lang="en-US" sz="1800" spc="-1" strike="noStrike">
-                <a:solidFill>
-                  <a:srgbClr val="000000"/>
-                </a:solidFill>
-                <a:latin typeface="Arial"/>
-              </a:rPr>
-              <a:t>i</a:t>
-            </a:r>
-            <a:r>
-              <a:rPr b="0" lang="en-US" sz="1800" spc="-1" strike="noStrike">
-                <a:solidFill>
-                  <a:srgbClr val="000000"/>
-                </a:solidFill>
-                <a:latin typeface="Arial"/>
-              </a:rPr>
-              <a:t>t</a:t>
-            </a:r>
-            <a:r>
-              <a:rPr b="0" lang="en-US" sz="1800" spc="-1" strike="noStrike">
-                <a:solidFill>
-                  <a:srgbClr val="000000"/>
-                </a:solidFill>
-                <a:latin typeface="Arial"/>
-              </a:rPr>
-              <a:t>l</a:t>
-            </a:r>
-            <a:r>
-              <a:rPr b="0" lang="en-US" sz="1800" spc="-1" strike="noStrike">
-                <a:solidFill>
-                  <a:srgbClr val="000000"/>
-                </a:solidFill>
-                <a:latin typeface="Arial"/>
-              </a:rPr>
-              <a:t>e</a:t>
-            </a:r>
-            <a:r>
-              <a:rPr b="0" lang="en-US" sz="1800" spc="-1" strike="noStrike">
-                <a:solidFill>
-                  <a:srgbClr val="000000"/>
-                </a:solidFill>
-                <a:latin typeface="Arial"/>
-              </a:rPr>
-              <a:t> </a:t>
-            </a:r>
-            <a:r>
-              <a:rPr b="0" lang="en-US" sz="1800" spc="-1" strike="noStrike">
-                <a:solidFill>
-                  <a:srgbClr val="000000"/>
-                </a:solidFill>
-                <a:latin typeface="Arial"/>
-              </a:rPr>
-              <a:t>t</a:t>
-            </a:r>
-            <a:r>
-              <a:rPr b="0" lang="en-US" sz="1800" spc="-1" strike="noStrike">
-                <a:solidFill>
-                  <a:srgbClr val="000000"/>
-                </a:solidFill>
-                <a:latin typeface="Arial"/>
-              </a:rPr>
-              <a:t>e</a:t>
-            </a:r>
-            <a:r>
-              <a:rPr b="0" lang="en-US" sz="1800" spc="-1" strike="noStrike">
-                <a:solidFill>
-                  <a:srgbClr val="000000"/>
-                </a:solidFill>
-                <a:latin typeface="Arial"/>
-              </a:rPr>
-              <a:t>x</a:t>
-            </a:r>
-            <a:r>
-              <a:rPr b="0" lang="en-US" sz="1800" spc="-1" strike="noStrike">
-                <a:solidFill>
-                  <a:srgbClr val="000000"/>
-                </a:solidFill>
-                <a:latin typeface="Arial"/>
-              </a:rPr>
-              <a:t>t</a:t>
-            </a:r>
-            <a:r>
-              <a:rPr b="0" lang="en-US" sz="1800" spc="-1" strike="noStrike">
-                <a:solidFill>
-                  <a:srgbClr val="000000"/>
-                </a:solidFill>
-                <a:latin typeface="Arial"/>
-              </a:rPr>
-              <a:t> </a:t>
-            </a:r>
-            <a:r>
-              <a:rPr b="0" lang="en-US" sz="1800" spc="-1" strike="noStrike">
-                <a:solidFill>
-                  <a:srgbClr val="000000"/>
-                </a:solidFill>
-                <a:latin typeface="Arial"/>
-              </a:rPr>
-              <a:t>f</a:t>
-            </a:r>
-            <a:r>
-              <a:rPr b="0" lang="en-US" sz="1800" spc="-1" strike="noStrike">
-                <a:solidFill>
-                  <a:srgbClr val="000000"/>
-                </a:solidFill>
-                <a:latin typeface="Arial"/>
-              </a:rPr>
-              <a:t>o</a:t>
-            </a:r>
-            <a:r>
-              <a:rPr b="0" lang="en-US" sz="1800" spc="-1" strike="noStrike">
-                <a:solidFill>
-                  <a:srgbClr val="000000"/>
-                </a:solidFill>
-                <a:latin typeface="Arial"/>
-              </a:rPr>
-              <a:t>r</a:t>
-            </a:r>
-            <a:r>
-              <a:rPr b="0" lang="en-US" sz="1800" spc="-1" strike="noStrike">
-                <a:solidFill>
-                  <a:srgbClr val="000000"/>
-                </a:solidFill>
-                <a:latin typeface="Arial"/>
-              </a:rPr>
-              <a:t>m</a:t>
-            </a:r>
-            <a:r>
-              <a:rPr b="0" lang="en-US" sz="1800" spc="-1" strike="noStrike">
-                <a:solidFill>
-                  <a:srgbClr val="000000"/>
-                </a:solidFill>
-                <a:latin typeface="Arial"/>
-              </a:rPr>
-              <a:t>a</a:t>
-            </a:r>
-            <a:r>
-              <a:rPr b="0" lang="en-US" sz="1800" spc="-1" strike="noStrike">
-                <a:solidFill>
-                  <a:srgbClr val="000000"/>
-                </a:solidFill>
-                <a:latin typeface="Arial"/>
-              </a:rPr>
-              <a:t>t</a:t>
+              <a:t>Click to edit the title text format</a:t>
             </a:r>
             <a:endParaRPr b="0" lang="en-US" sz="1800" spc="-1" strike="noStrike">
               <a:solidFill>
@@ -2548,8 +2246,8 @@
         </p:nvSpPr>
         <p:spPr>
           <a:xfrm>
-            <a:off x="272520" y="4246560"/>
-            <a:ext cx="8801640" cy="3313800"/>
+            <a:off x="504000" y="1326600"/>
+            <a:ext cx="9071640" cy="3288240"/>
           </a:xfrm>
           <a:prstGeom prst="rect">
             <a:avLst/>
@@ -2774,7 +2472,7 @@
         <p:spPr>
           <a:xfrm>
             <a:off x="5579640" y="5129640"/>
-            <a:ext cx="4319640" cy="390960"/>
+            <a:ext cx="4319280" cy="390600"/>
           </a:xfrm>
           <a:prstGeom prst="rect">
             <a:avLst/>
@@ -2846,7 +2544,7 @@
         <p:spPr>
           <a:xfrm>
             <a:off x="7379640" y="4589640"/>
-            <a:ext cx="2519640" cy="390960"/>
+            <a:ext cx="2519280" cy="390600"/>
           </a:xfrm>
           <a:prstGeom prst="rect">
             <a:avLst/>
@@ -2887,7 +2585,7 @@
                 <a:tab algn="l" pos="0"/>
               </a:tabLst>
             </a:pPr>
-            <a:fld id="{CFCEE82B-716D-4E3F-BCE2-02929EF04CFC}" type="slidenum">
+            <a:fld id="{C3C8CC35-3181-4A21-86DC-8F0B5AF9A8FE}" type="slidenum">
               <a:rPr b="0" lang="en-US" sz="2600" spc="-1" strike="noStrike">
                 <a:solidFill>
                   <a:srgbClr val="000000"/>
@@ -2918,7 +2616,7 @@
         <p:spPr>
           <a:xfrm>
             <a:off x="7019640" y="4913640"/>
-            <a:ext cx="2879640" cy="390960"/>
+            <a:ext cx="2879280" cy="390600"/>
           </a:xfrm>
           <a:prstGeom prst="rect">
             <a:avLst/>
@@ -3000,15 +2698,15 @@
         <p:spPr>
           <a:xfrm>
             <a:off x="1096920" y="4388760"/>
-            <a:ext cx="8982360" cy="1280520"/>
+            <a:ext cx="8982000" cy="1280160"/>
           </a:xfrm>
           <a:custGeom>
             <a:avLst/>
             <a:gdLst>
-              <a:gd name="textAreaLeft" fmla="*/ 0 w 8982360"/>
-              <a:gd name="textAreaRight" fmla="*/ 8982720 w 8982360"/>
-              <a:gd name="textAreaTop" fmla="*/ 0 h 1280520"/>
-              <a:gd name="textAreaBottom" fmla="*/ 1280880 h 1280520"/>
+              <a:gd name="textAreaLeft" fmla="*/ 0 w 8982000"/>
+              <a:gd name="textAreaRight" fmla="*/ 8982720 w 8982000"/>
+              <a:gd name="textAreaTop" fmla="*/ 0 h 1280160"/>
+              <a:gd name="textAreaBottom" fmla="*/ 1280880 h 1280160"/>
             </a:gdLst>
             <a:ahLst/>
             <a:rect l="textAreaLeft" t="textAreaTop" r="textAreaRight" b="textAreaBottom"/>
@@ -3061,6 +2759,7 @@
                 <a:srgbClr val="000000"/>
               </a:solidFill>
               <a:latin typeface="Arial"/>
+              <a:ea typeface="DejaVu Sans"/>
             </a:endParaRPr>
           </a:p>
         </p:txBody>
@@ -3074,15 +2773,15 @@
         <p:spPr>
           <a:xfrm>
             <a:off x="0" y="411120"/>
-            <a:ext cx="10079640" cy="5258160"/>
+            <a:ext cx="10079280" cy="5257800"/>
           </a:xfrm>
           <a:custGeom>
             <a:avLst/>
             <a:gdLst>
-              <a:gd name="textAreaLeft" fmla="*/ 0 w 10079640"/>
-              <a:gd name="textAreaRight" fmla="*/ 10080000 w 10079640"/>
-              <a:gd name="textAreaTop" fmla="*/ 0 h 5258160"/>
-              <a:gd name="textAreaBottom" fmla="*/ 5258520 h 5258160"/>
+              <a:gd name="textAreaLeft" fmla="*/ 0 w 10079280"/>
+              <a:gd name="textAreaRight" fmla="*/ 10080000 w 10079280"/>
+              <a:gd name="textAreaTop" fmla="*/ 0 h 5257800"/>
+              <a:gd name="textAreaBottom" fmla="*/ 5258520 h 5257800"/>
             </a:gdLst>
             <a:ahLst/>
             <a:rect l="textAreaLeft" t="textAreaTop" r="textAreaRight" b="textAreaBottom"/>
@@ -3141,6 +2840,7 @@
                 <a:srgbClr val="000000"/>
               </a:solidFill>
               <a:latin typeface="Arial"/>
+              <a:ea typeface="DejaVu Sans"/>
             </a:endParaRPr>
           </a:p>
         </p:txBody>
@@ -3154,15 +2854,15 @@
         <p:spPr>
           <a:xfrm>
             <a:off x="0" y="0"/>
-            <a:ext cx="10080000" cy="1714320"/>
+            <a:ext cx="10079640" cy="1713960"/>
           </a:xfrm>
           <a:custGeom>
             <a:avLst/>
             <a:gdLst>
-              <a:gd name="textAreaLeft" fmla="*/ 0 w 10080000"/>
-              <a:gd name="textAreaRight" fmla="*/ 10080360 w 10080000"/>
-              <a:gd name="textAreaTop" fmla="*/ 0 h 1714320"/>
-              <a:gd name="textAreaBottom" fmla="*/ 1714680 h 1714320"/>
+              <a:gd name="textAreaLeft" fmla="*/ 0 w 10079640"/>
+              <a:gd name="textAreaRight" fmla="*/ 10080360 w 10079640"/>
+              <a:gd name="textAreaTop" fmla="*/ 0 h 1713960"/>
+              <a:gd name="textAreaBottom" fmla="*/ 1714680 h 1713960"/>
             </a:gdLst>
             <a:ahLst/>
             <a:rect l="textAreaLeft" t="textAreaTop" r="textAreaRight" b="textAreaBottom"/>
@@ -3218,6 +2918,7 @@
                 <a:srgbClr val="000000"/>
               </a:solidFill>
               <a:latin typeface="Arial"/>
+              <a:ea typeface="DejaVu Sans"/>
             </a:endParaRPr>
           </a:p>
         </p:txBody>
@@ -3235,7 +2936,7 @@
         <p:spPr>
           <a:xfrm>
             <a:off x="466200" y="3247560"/>
-            <a:ext cx="9001440" cy="953640"/>
+            <a:ext cx="9001080" cy="953280"/>
           </a:xfrm>
           <a:prstGeom prst="rect">
             <a:avLst/>
@@ -3283,8 +2984,8 @@
         </p:nvSpPr>
         <p:spPr>
           <a:xfrm>
-            <a:off x="272520" y="4246560"/>
-            <a:ext cx="8801640" cy="3313800"/>
+            <a:off x="504000" y="1326600"/>
+            <a:ext cx="9071640" cy="3288240"/>
           </a:xfrm>
           <a:prstGeom prst="rect">
             <a:avLst/>
@@ -3509,7 +3210,7 @@
         <p:spPr>
           <a:xfrm>
             <a:off x="5579640" y="5129640"/>
-            <a:ext cx="4319640" cy="390960"/>
+            <a:ext cx="4319280" cy="390600"/>
           </a:xfrm>
           <a:prstGeom prst="rect">
             <a:avLst/>
@@ -3581,7 +3282,7 @@
         <p:spPr>
           <a:xfrm>
             <a:off x="7379640" y="4589640"/>
-            <a:ext cx="2519640" cy="390960"/>
+            <a:ext cx="2519280" cy="390600"/>
           </a:xfrm>
           <a:prstGeom prst="rect">
             <a:avLst/>
@@ -3622,7 +3323,7 @@
                 <a:tab algn="l" pos="0"/>
               </a:tabLst>
             </a:pPr>
-            <a:fld id="{4D9FAE66-B0BE-4C04-8CCD-0DEFF82ACD96}" type="slidenum">
+            <a:fld id="{9EDAB89F-7489-4C77-80FD-55500ECA5B02}" type="slidenum">
               <a:rPr b="0" lang="en-US" sz="2600" spc="-1" strike="noStrike">
                 <a:solidFill>
                   <a:srgbClr val="000000"/>
@@ -3653,7 +3354,7 @@
         <p:spPr>
           <a:xfrm>
             <a:off x="7019640" y="4913640"/>
-            <a:ext cx="2879640" cy="390960"/>
+            <a:ext cx="2879280" cy="390600"/>
           </a:xfrm>
           <a:prstGeom prst="rect">
             <a:avLst/>
@@ -3735,15 +3436,15 @@
         <p:spPr>
           <a:xfrm>
             <a:off x="1403640" y="4388760"/>
-            <a:ext cx="8676000" cy="1280160"/>
+            <a:ext cx="8675640" cy="1279800"/>
           </a:xfrm>
           <a:custGeom>
             <a:avLst/>
             <a:gdLst>
-              <a:gd name="textAreaLeft" fmla="*/ 0 w 8676000"/>
-              <a:gd name="textAreaRight" fmla="*/ 8676360 w 8676000"/>
-              <a:gd name="textAreaTop" fmla="*/ 0 h 1280160"/>
-              <a:gd name="textAreaBottom" fmla="*/ 1280520 h 1280160"/>
+              <a:gd name="textAreaLeft" fmla="*/ 0 w 8675640"/>
+              <a:gd name="textAreaRight" fmla="*/ 8676360 w 8675640"/>
+              <a:gd name="textAreaTop" fmla="*/ 0 h 1279800"/>
+              <a:gd name="textAreaBottom" fmla="*/ 1280520 h 1279800"/>
             </a:gdLst>
             <a:ahLst/>
             <a:rect l="textAreaLeft" t="textAreaTop" r="textAreaRight" b="textAreaBottom"/>
@@ -3791,6 +3492,7 @@
                 <a:srgbClr val="000000"/>
               </a:solidFill>
               <a:latin typeface="Arial"/>
+              <a:ea typeface="DejaVu Sans"/>
             </a:endParaRPr>
           </a:p>
         </p:txBody>
@@ -3804,15 +3506,15 @@
         <p:spPr>
           <a:xfrm>
             <a:off x="0" y="0"/>
-            <a:ext cx="10079640" cy="2400120"/>
+            <a:ext cx="10079280" cy="2399760"/>
           </a:xfrm>
           <a:custGeom>
             <a:avLst/>
             <a:gdLst>
-              <a:gd name="textAreaLeft" fmla="*/ 0 w 10079640"/>
-              <a:gd name="textAreaRight" fmla="*/ 10080000 w 10079640"/>
-              <a:gd name="textAreaTop" fmla="*/ 0 h 2400120"/>
-              <a:gd name="textAreaBottom" fmla="*/ 2400480 h 2400120"/>
+              <a:gd name="textAreaLeft" fmla="*/ 0 w 10079280"/>
+              <a:gd name="textAreaRight" fmla="*/ 10080000 w 10079280"/>
+              <a:gd name="textAreaTop" fmla="*/ 0 h 2399760"/>
+              <a:gd name="textAreaBottom" fmla="*/ 2400480 h 2399760"/>
             </a:gdLst>
             <a:ahLst/>
             <a:rect l="textAreaLeft" t="textAreaTop" r="textAreaRight" b="textAreaBottom"/>
@@ -3863,6 +3565,7 @@
                 <a:srgbClr val="000000"/>
               </a:solidFill>
               <a:latin typeface="Arial"/>
+              <a:ea typeface="DejaVu Sans"/>
             </a:endParaRPr>
           </a:p>
         </p:txBody>
@@ -3876,15 +3579,15 @@
         <p:spPr>
           <a:xfrm>
             <a:off x="0" y="0"/>
-            <a:ext cx="10079640" cy="2400120"/>
+            <a:ext cx="10079280" cy="2399760"/>
           </a:xfrm>
           <a:custGeom>
             <a:avLst/>
             <a:gdLst>
-              <a:gd name="textAreaLeft" fmla="*/ 0 w 10079640"/>
-              <a:gd name="textAreaRight" fmla="*/ 10080000 w 10079640"/>
-              <a:gd name="textAreaTop" fmla="*/ 0 h 2400120"/>
-              <a:gd name="textAreaBottom" fmla="*/ 2400480 h 2400120"/>
+              <a:gd name="textAreaLeft" fmla="*/ 0 w 10079280"/>
+              <a:gd name="textAreaRight" fmla="*/ 10080000 w 10079280"/>
+              <a:gd name="textAreaTop" fmla="*/ 0 h 2399760"/>
+              <a:gd name="textAreaBottom" fmla="*/ 2400480 h 2399760"/>
             </a:gdLst>
             <a:ahLst/>
             <a:rect l="textAreaLeft" t="textAreaTop" r="textAreaRight" b="textAreaBottom"/>
@@ -3935,6 +3638,7 @@
                 <a:srgbClr val="000000"/>
               </a:solidFill>
               <a:latin typeface="Arial"/>
+              <a:ea typeface="DejaVu Sans"/>
             </a:endParaRPr>
           </a:p>
         </p:txBody>
@@ -3948,15 +3652,15 @@
         <p:spPr>
           <a:xfrm>
             <a:off x="1403640" y="4388760"/>
-            <a:ext cx="8676000" cy="1280160"/>
+            <a:ext cx="8675640" cy="1279800"/>
           </a:xfrm>
           <a:custGeom>
             <a:avLst/>
             <a:gdLst>
-              <a:gd name="textAreaLeft" fmla="*/ 0 w 8676000"/>
-              <a:gd name="textAreaRight" fmla="*/ 8676360 w 8676000"/>
-              <a:gd name="textAreaTop" fmla="*/ 0 h 1280160"/>
-              <a:gd name="textAreaBottom" fmla="*/ 1280520 h 1280160"/>
+              <a:gd name="textAreaLeft" fmla="*/ 0 w 8675640"/>
+              <a:gd name="textAreaRight" fmla="*/ 8676360 w 8675640"/>
+              <a:gd name="textAreaTop" fmla="*/ 0 h 1279800"/>
+              <a:gd name="textAreaBottom" fmla="*/ 1280520 h 1279800"/>
             </a:gdLst>
             <a:ahLst/>
             <a:rect l="textAreaLeft" t="textAreaTop" r="textAreaRight" b="textAreaBottom"/>
@@ -4004,6 +3708,7 @@
                 <a:srgbClr val="000000"/>
               </a:solidFill>
               <a:latin typeface="Arial"/>
+              <a:ea typeface="DejaVu Sans"/>
             </a:endParaRPr>
           </a:p>
         </p:txBody>
@@ -4017,15 +3722,15 @@
         <p:spPr>
           <a:xfrm>
             <a:off x="6480" y="-9720"/>
-            <a:ext cx="10079640" cy="2468520"/>
+            <a:ext cx="10079280" cy="2468160"/>
           </a:xfrm>
           <a:custGeom>
             <a:avLst/>
             <a:gdLst>
-              <a:gd name="textAreaLeft" fmla="*/ 0 w 10079640"/>
-              <a:gd name="textAreaRight" fmla="*/ 10080000 w 10079640"/>
-              <a:gd name="textAreaTop" fmla="*/ 0 h 2468520"/>
-              <a:gd name="textAreaBottom" fmla="*/ 2468880 h 2468520"/>
+              <a:gd name="textAreaLeft" fmla="*/ 0 w 10079280"/>
+              <a:gd name="textAreaRight" fmla="*/ 10080000 w 10079280"/>
+              <a:gd name="textAreaTop" fmla="*/ 0 h 2468160"/>
+              <a:gd name="textAreaBottom" fmla="*/ 2468880 h 2468160"/>
             </a:gdLst>
             <a:ahLst/>
             <a:rect l="textAreaLeft" t="textAreaTop" r="textAreaRight" b="textAreaBottom"/>
@@ -4081,6 +3786,7 @@
                 <a:srgbClr val="000000"/>
               </a:solidFill>
               <a:latin typeface="Arial"/>
+              <a:ea typeface="DejaVu Sans"/>
             </a:endParaRPr>
           </a:p>
         </p:txBody>
@@ -4094,15 +3800,15 @@
         <p:spPr>
           <a:xfrm>
             <a:off x="1403280" y="4388760"/>
-            <a:ext cx="8676000" cy="1280160"/>
+            <a:ext cx="8675640" cy="1279800"/>
           </a:xfrm>
           <a:custGeom>
             <a:avLst/>
             <a:gdLst>
-              <a:gd name="textAreaLeft" fmla="*/ 0 w 8676000"/>
-              <a:gd name="textAreaRight" fmla="*/ 8676360 w 8676000"/>
-              <a:gd name="textAreaTop" fmla="*/ 0 h 1280160"/>
-              <a:gd name="textAreaBottom" fmla="*/ 1280520 h 1280160"/>
+              <a:gd name="textAreaLeft" fmla="*/ 0 w 8675640"/>
+              <a:gd name="textAreaRight" fmla="*/ 8676360 w 8675640"/>
+              <a:gd name="textAreaTop" fmla="*/ 0 h 1279800"/>
+              <a:gd name="textAreaBottom" fmla="*/ 1280520 h 1279800"/>
             </a:gdLst>
             <a:ahLst/>
             <a:rect l="textAreaLeft" t="textAreaTop" r="textAreaRight" b="textAreaBottom"/>
@@ -4150,6 +3856,7 @@
                 <a:srgbClr val="000000"/>
               </a:solidFill>
               <a:latin typeface="Arial"/>
+              <a:ea typeface="DejaVu Sans"/>
             </a:endParaRPr>
           </a:p>
         </p:txBody>
@@ -4162,8 +3869,8 @@
         </p:nvSpPr>
         <p:spPr>
           <a:xfrm rot="20952000">
-            <a:off x="223920" y="1917000"/>
-            <a:ext cx="9401760" cy="2593800"/>
+            <a:off x="223560" y="1917000"/>
+            <a:ext cx="9401400" cy="2593440"/>
           </a:xfrm>
           <a:prstGeom prst="roundRect">
             <a:avLst>
@@ -4215,7 +3922,7 @@
         <p:spPr>
           <a:xfrm>
             <a:off x="273960" y="2759400"/>
-            <a:ext cx="639720" cy="1225440"/>
+            <a:ext cx="639360" cy="1225080"/>
           </a:xfrm>
           <a:prstGeom prst="rect">
             <a:avLst/>
@@ -4247,6 +3954,7 @@
                   <a:srgbClr val="000000"/>
                 </a:solidFill>
                 <a:latin typeface="Arial"/>
+                <a:ea typeface="DejaVu Sans"/>
               </a:rPr>
               <a:t>“</a:t>
             </a:r>
@@ -4268,7 +3976,7 @@
         <p:spPr>
           <a:xfrm>
             <a:off x="9215640" y="3517560"/>
-            <a:ext cx="639720" cy="1225440"/>
+            <a:ext cx="639360" cy="1225080"/>
           </a:xfrm>
           <a:prstGeom prst="rect">
             <a:avLst/>
@@ -4300,6 +4008,7 @@
                   <a:srgbClr val="000000"/>
                 </a:solidFill>
                 <a:latin typeface="Arial"/>
+                <a:ea typeface="DejaVu Sans"/>
               </a:rPr>
               <a:t>”</a:t>
             </a:r>
@@ -4325,7 +4034,7 @@
         <p:spPr>
           <a:xfrm>
             <a:off x="466200" y="3247560"/>
-            <a:ext cx="9001440" cy="953640"/>
+            <a:ext cx="9001080" cy="953280"/>
           </a:xfrm>
           <a:prstGeom prst="rect">
             <a:avLst/>
@@ -4373,8 +4082,8 @@
         </p:nvSpPr>
         <p:spPr>
           <a:xfrm>
-            <a:off x="272520" y="4246560"/>
-            <a:ext cx="8801640" cy="3313800"/>
+            <a:off x="504000" y="1326600"/>
+            <a:ext cx="9071640" cy="3288240"/>
           </a:xfrm>
           <a:prstGeom prst="rect">
             <a:avLst/>
@@ -4599,7 +4308,7 @@
         <p:spPr>
           <a:xfrm>
             <a:off x="5579640" y="5129640"/>
-            <a:ext cx="4319640" cy="390960"/>
+            <a:ext cx="4319280" cy="390600"/>
           </a:xfrm>
           <a:prstGeom prst="rect">
             <a:avLst/>
@@ -4671,7 +4380,7 @@
         <p:spPr>
           <a:xfrm>
             <a:off x="7379640" y="4589640"/>
-            <a:ext cx="2519640" cy="390960"/>
+            <a:ext cx="2519280" cy="390600"/>
           </a:xfrm>
           <a:prstGeom prst="rect">
             <a:avLst/>
@@ -4712,7 +4421,7 @@
                 <a:tab algn="l" pos="0"/>
               </a:tabLst>
             </a:pPr>
-            <a:fld id="{8520B6FF-50B7-4137-A883-589FC23C89C5}" type="slidenum">
+            <a:fld id="{2DB0174F-4DB8-40BD-8AAB-9606F39C450C}" type="slidenum">
               <a:rPr b="0" lang="en-US" sz="2600" spc="-1" strike="noStrike">
                 <a:solidFill>
                   <a:srgbClr val="000000"/>
@@ -4743,7 +4452,7 @@
         <p:spPr>
           <a:xfrm>
             <a:off x="7019640" y="4913640"/>
-            <a:ext cx="2879640" cy="390960"/>
+            <a:ext cx="2879280" cy="390600"/>
           </a:xfrm>
           <a:prstGeom prst="rect">
             <a:avLst/>
@@ -4828,8 +4537,8 @@
         </p:nvSpPr>
         <p:spPr>
           <a:xfrm rot="21114000">
-            <a:off x="445680" y="2255040"/>
-            <a:ext cx="9002160" cy="1607400"/>
+            <a:off x="445320" y="2255040"/>
+            <a:ext cx="9001800" cy="1607040"/>
           </a:xfrm>
           <a:prstGeom prst="rect">
             <a:avLst/>
@@ -4888,8 +4597,8 @@
         </p:nvSpPr>
         <p:spPr>
           <a:xfrm rot="21117000">
-            <a:off x="614520" y="3528000"/>
-            <a:ext cx="8803080" cy="619200"/>
+            <a:off x="614160" y="3528000"/>
+            <a:ext cx="8802720" cy="618840"/>
           </a:xfrm>
           <a:prstGeom prst="rect">
             <a:avLst/>
@@ -4921,12 +4630,13 @@
               <a:buFont typeface="Wingdings" charset="2"/>
               <a:buChar char=""/>
             </a:pPr>
-            <a:fld id="{C4BBA330-84A7-4404-96B9-DA97A333325F}" type="author">
+            <a:fld id="{9CF69D4E-87E0-4446-A337-661B66E30579}" type="author">
               <a:rPr b="0" lang="en-US" sz="3200" spc="-1" strike="noStrike">
                 <a:solidFill>
                   <a:srgbClr val="000000"/>
                 </a:solidFill>
                 <a:latin typeface="Arial"/>
+                <a:ea typeface="DejaVu Sans"/>
               </a:rPr>
               <a:t> </a:t>
             </a:fld>
@@ -4936,6 +4646,7 @@
                   <a:srgbClr val="000000"/>
                 </a:solidFill>
                 <a:latin typeface="Arial"/>
+                <a:ea typeface="DejaVu Sans"/>
               </a:rPr>
               <a:t>By team ‘Modemas’</a:t>
             </a:r>
@@ -4994,8 +4705,8 @@
         </p:nvSpPr>
         <p:spPr>
           <a:xfrm rot="21111000">
-            <a:off x="124560" y="-133200"/>
-            <a:ext cx="9001440" cy="953640"/>
+            <a:off x="124200" y="-132840"/>
+            <a:ext cx="9001080" cy="953280"/>
           </a:xfrm>
           <a:prstGeom prst="rect">
             <a:avLst/>
@@ -5051,7 +4762,7 @@
         <p:txBody>
           <a:bodyPr/>
           <a:p>
-            <a:fld id="{92C57882-871D-432F-8E59-2090DCCCD09C}" type="slidenum">
+            <a:fld id="{3D852957-D941-4563-BADF-D26936D38E1C}" type="slidenum">
               <a:t>2</a:t>
             </a:fld>
           </a:p>
@@ -5103,8 +4814,8 @@
         </p:nvSpPr>
         <p:spPr>
           <a:xfrm rot="21111000">
-            <a:off x="91800" y="67320"/>
-            <a:ext cx="9001440" cy="953640"/>
+            <a:off x="91440" y="67320"/>
+            <a:ext cx="9001080" cy="953280"/>
           </a:xfrm>
           <a:prstGeom prst="rect">
             <a:avLst/>
@@ -5159,7 +4870,7 @@
         <p:spPr>
           <a:xfrm>
             <a:off x="432000" y="2057400"/>
-            <a:ext cx="5511600" cy="2158560"/>
+            <a:ext cx="5511240" cy="2158200"/>
           </a:xfrm>
           <a:prstGeom prst="rect">
             <a:avLst/>
@@ -5183,7 +4894,7 @@
         <p:txBody>
           <a:bodyPr/>
           <a:p>
-            <a:fld id="{74EE4919-94D8-4354-B725-653B0B547CCD}" type="slidenum">
+            <a:fld id="{3BD625DD-94CF-4326-9499-4F7F918802D0}" type="slidenum">
               <a:t>3</a:t>
             </a:fld>
           </a:p>
@@ -5235,8 +4946,8 @@
         </p:nvSpPr>
         <p:spPr>
           <a:xfrm rot="21111000">
-            <a:off x="91800" y="67320"/>
-            <a:ext cx="9001440" cy="953640"/>
+            <a:off x="91440" y="67320"/>
+            <a:ext cx="9001080" cy="953280"/>
           </a:xfrm>
           <a:prstGeom prst="rect">
             <a:avLst/>
@@ -5291,7 +5002,7 @@
         <p:spPr>
           <a:xfrm>
             <a:off x="503640" y="1785240"/>
-            <a:ext cx="8869680" cy="3288240"/>
+            <a:ext cx="8869320" cy="3287880"/>
           </a:xfrm>
           <a:prstGeom prst="rect">
             <a:avLst/>
@@ -5334,7 +5045,7 @@
         <p:spPr>
           <a:xfrm>
             <a:off x="400320" y="1759320"/>
-            <a:ext cx="4171680" cy="3269880"/>
+            <a:ext cx="4171320" cy="3269520"/>
           </a:xfrm>
           <a:prstGeom prst="rect">
             <a:avLst/>
@@ -5358,7 +5069,7 @@
         <p:txBody>
           <a:bodyPr/>
           <a:p>
-            <a:fld id="{32C8334D-2043-4A8A-B476-518A2D280B38}" type="slidenum">
+            <a:fld id="{1D018EA2-B3F9-48FD-AA8A-0C1A52CF0EA8}" type="slidenum">
               <a:t>4</a:t>
             </a:fld>
           </a:p>
@@ -5410,8 +5121,8 @@
         </p:nvSpPr>
         <p:spPr>
           <a:xfrm rot="21111000">
-            <a:off x="91800" y="67320"/>
-            <a:ext cx="9001440" cy="953640"/>
+            <a:off x="91440" y="67320"/>
+            <a:ext cx="9001080" cy="953280"/>
           </a:xfrm>
           <a:prstGeom prst="rect">
             <a:avLst/>
@@ -5466,7 +5177,7 @@
         <p:spPr>
           <a:xfrm>
             <a:off x="5029200" y="1733760"/>
-            <a:ext cx="4711320" cy="1238040"/>
+            <a:ext cx="4710960" cy="1237680"/>
           </a:xfrm>
           <a:prstGeom prst="rect">
             <a:avLst/>
@@ -5490,7 +5201,7 @@
         <p:txBody>
           <a:bodyPr/>
           <a:p>
-            <a:fld id="{777B95FD-79C3-4B2C-9CCD-B41F1379664B}" type="slidenum">
+            <a:fld id="{45C3A2BD-E1F7-4ACF-8F5E-3BD4F67E7EBB}" type="slidenum">
               <a:t>5</a:t>
             </a:fld>
           </a:p>
@@ -5542,8 +5253,8 @@
         </p:nvSpPr>
         <p:spPr>
           <a:xfrm rot="21111000">
-            <a:off x="91800" y="67320"/>
-            <a:ext cx="9001440" cy="953640"/>
+            <a:off x="91440" y="67320"/>
+            <a:ext cx="9001080" cy="953280"/>
           </a:xfrm>
           <a:prstGeom prst="rect">
             <a:avLst/>
@@ -5598,7 +5309,7 @@
         <p:spPr>
           <a:xfrm>
             <a:off x="457200" y="1748880"/>
-            <a:ext cx="3446640" cy="3737520"/>
+            <a:ext cx="3446280" cy="3737160"/>
           </a:xfrm>
           <a:prstGeom prst="rect">
             <a:avLst/>
@@ -5622,7 +5333,7 @@
         <p:txBody>
           <a:bodyPr/>
           <a:p>
-            <a:fld id="{92C6404F-8158-4DE0-B16E-B9E7B51F88DE}" type="slidenum">
+            <a:fld id="{B45770CE-5143-4E45-BD27-30EEA967B5B5}" type="slidenum">
               <a:t>6</a:t>
             </a:fld>
           </a:p>
@@ -5674,8 +5385,8 @@
         </p:nvSpPr>
         <p:spPr>
           <a:xfrm rot="21111000">
-            <a:off x="91800" y="67320"/>
-            <a:ext cx="9001440" cy="953640"/>
+            <a:off x="91440" y="67320"/>
+            <a:ext cx="9001080" cy="953280"/>
           </a:xfrm>
           <a:prstGeom prst="rect">
             <a:avLst/>
@@ -5730,7 +5441,7 @@
         <p:spPr>
           <a:xfrm>
             <a:off x="609840" y="1886400"/>
-            <a:ext cx="6476760" cy="2685600"/>
+            <a:ext cx="6476400" cy="2685240"/>
           </a:xfrm>
           <a:prstGeom prst="rect">
             <a:avLst/>
@@ -5754,7 +5465,7 @@
         <p:txBody>
           <a:bodyPr/>
           <a:p>
-            <a:fld id="{66F64BCD-A96C-4854-A105-C1E181CD8ECD}" type="slidenum">
+            <a:fld id="{38BDEDF3-B0EC-4132-99C9-89B403F2872F}" type="slidenum">
               <a:t>7</a:t>
             </a:fld>
           </a:p>
@@ -5806,8 +5517,8 @@
         </p:nvSpPr>
         <p:spPr>
           <a:xfrm rot="21111000">
-            <a:off x="91800" y="67320"/>
-            <a:ext cx="9001440" cy="953640"/>
+            <a:off x="91440" y="67320"/>
+            <a:ext cx="9001080" cy="953280"/>
           </a:xfrm>
           <a:prstGeom prst="rect">
             <a:avLst/>
@@ -5849,6 +5560,29 @@
           </a:p>
         </p:txBody>
       </p:sp>
+      <p:pic>
+        <p:nvPicPr>
+          <p:cNvPr id="66" name="" descr=""/>
+          <p:cNvPicPr/>
+          <p:nvPr/>
+        </p:nvPicPr>
+        <p:blipFill>
+          <a:blip r:embed="rId1"/>
+          <a:stretch/>
+        </p:blipFill>
+        <p:spPr>
+          <a:xfrm>
+            <a:off x="235800" y="1886400"/>
+            <a:ext cx="5479200" cy="2228400"/>
+          </a:xfrm>
+          <a:prstGeom prst="rect">
+            <a:avLst/>
+          </a:prstGeom>
+          <a:ln w="0">
+            <a:noFill/>
+          </a:ln>
+        </p:spPr>
+      </p:pic>
       <p:sp>
         <p:nvSpPr>
           <p:cNvPr id="3" name="PlaceHolder 2"/>
@@ -5863,7 +5597,7 @@
         <p:txBody>
           <a:bodyPr/>
           <a:p>
-            <a:fld id="{23DEB50F-511B-4E45-BA92-4B801F4A9CD9}" type="slidenum">
+            <a:fld id="{22C258C8-2C44-476E-9D09-C4E005BD09EE}" type="slidenum">
               <a:t>8</a:t>
             </a:fld>
           </a:p>
@@ -5905,7 +5639,7 @@
       </p:grpSpPr>
       <p:sp>
         <p:nvSpPr>
-          <p:cNvPr id="66" name="PlaceHolder 1"/>
+          <p:cNvPr id="67" name="PlaceHolder 1"/>
           <p:cNvSpPr>
             <a:spLocks noGrp="1"/>
           </p:cNvSpPr>
@@ -5915,8 +5649,8 @@
         </p:nvSpPr>
         <p:spPr>
           <a:xfrm rot="21114000">
-            <a:off x="445680" y="2255040"/>
-            <a:ext cx="9002160" cy="1607400"/>
+            <a:off x="445320" y="2255040"/>
+            <a:ext cx="9001800" cy="1607040"/>
           </a:xfrm>
           <a:prstGeom prst="rect">
             <a:avLst/>
@@ -5960,14 +5694,14 @@
       </p:sp>
       <p:sp>
         <p:nvSpPr>
-          <p:cNvPr id="67" name=""/>
+          <p:cNvPr id="68" name=""/>
           <p:cNvSpPr/>
           <p:nvPr/>
         </p:nvSpPr>
         <p:spPr>
           <a:xfrm rot="21117000">
-            <a:off x="614520" y="3528000"/>
-            <a:ext cx="8803080" cy="619200"/>
+            <a:off x="614160" y="3528000"/>
+            <a:ext cx="8802720" cy="618840"/>
           </a:xfrm>
           <a:prstGeom prst="rect">
             <a:avLst/>
@@ -5999,12 +5733,13 @@
               <a:buFont typeface="Wingdings" charset="2"/>
               <a:buChar char=""/>
             </a:pPr>
-            <a:fld id="{13D88A6D-A239-4A27-8EAC-0860C7CC923A}" type="author">
+            <a:fld id="{9982DB90-C265-4913-A7C5-5A51F8746BCD}" type="author">
               <a:rPr b="0" lang="en-US" sz="2400" spc="-1" strike="noStrike">
                 <a:solidFill>
                   <a:srgbClr val="000000"/>
                 </a:solidFill>
                 <a:latin typeface="Arial"/>
+                <a:ea typeface="DejaVu Sans"/>
               </a:rPr>
               <a:t> </a:t>
             </a:fld>

</xml_diff>

<commit_message>
Modified the slides, they are now kind of finished.
</commit_message>
<xml_diff>
--- a/beta.pptx
+++ b/beta.pptx
@@ -54,7 +54,7 @@
         <p:spPr>
           <a:xfrm>
             <a:off x="466200" y="3247560"/>
-            <a:ext cx="9001080" cy="953280"/>
+            <a:ext cx="9000720" cy="952920"/>
           </a:xfrm>
           <a:prstGeom prst="rect">
             <a:avLst/>
@@ -158,7 +158,7 @@
         <p:txBody>
           <a:bodyPr/>
           <a:p>
-            <a:fld id="{25B15E70-3EF9-402F-8089-0FBCF0897B61}" type="slidenum">
+            <a:fld id="{46EE2BAD-B3FC-43A1-9DAD-3E86CB1CBF2A}" type="slidenum">
               <a:t>&lt;#&gt;</a:t>
             </a:fld>
           </a:p>
@@ -220,7 +220,7 @@
         <p:spPr>
           <a:xfrm>
             <a:off x="466200" y="3247560"/>
-            <a:ext cx="9001080" cy="953280"/>
+            <a:ext cx="9000720" cy="952920"/>
           </a:xfrm>
           <a:prstGeom prst="rect">
             <a:avLst/>
@@ -321,7 +321,7 @@
         <p:txBody>
           <a:bodyPr/>
           <a:p>
-            <a:fld id="{879B8E0D-E8C4-4330-89DF-4FB47A75AE3D}" type="slidenum">
+            <a:fld id="{60FDF24A-D70F-4207-A6BB-B1BF899F69A7}" type="slidenum">
               <a:t>&lt;#&gt;</a:t>
             </a:fld>
           </a:p>
@@ -383,7 +383,7 @@
         <p:spPr>
           <a:xfrm>
             <a:off x="466200" y="3247560"/>
-            <a:ext cx="9001080" cy="953280"/>
+            <a:ext cx="9000720" cy="952920"/>
           </a:xfrm>
           <a:prstGeom prst="rect">
             <a:avLst/>
@@ -487,7 +487,7 @@
         <p:txBody>
           <a:bodyPr/>
           <a:p>
-            <a:fld id="{5426EA62-CF3C-4CCB-9F7B-995ECC833232}" type="slidenum">
+            <a:fld id="{C61F9420-4198-48C7-B671-E5C304464547}" type="slidenum">
               <a:t>&lt;#&gt;</a:t>
             </a:fld>
           </a:p>
@@ -549,7 +549,7 @@
         <p:spPr>
           <a:xfrm>
             <a:off x="466200" y="3247560"/>
-            <a:ext cx="9001080" cy="953280"/>
+            <a:ext cx="9000720" cy="952920"/>
           </a:xfrm>
           <a:prstGeom prst="rect">
             <a:avLst/>
@@ -653,7 +653,7 @@
         <p:txBody>
           <a:bodyPr/>
           <a:p>
-            <a:fld id="{142AF100-FB03-4029-BE40-6DE4BCFC697C}" type="slidenum">
+            <a:fld id="{FA5D341C-7163-4666-8AC7-6B744BD04E6A}" type="slidenum">
               <a:t>&lt;#&gt;</a:t>
             </a:fld>
           </a:p>
@@ -715,7 +715,7 @@
         <p:spPr>
           <a:xfrm>
             <a:off x="466200" y="3247560"/>
-            <a:ext cx="9001080" cy="953280"/>
+            <a:ext cx="9000720" cy="952920"/>
           </a:xfrm>
           <a:prstGeom prst="rect">
             <a:avLst/>
@@ -819,7 +819,7 @@
         <p:txBody>
           <a:bodyPr/>
           <a:p>
-            <a:fld id="{6FB1B23A-550C-4712-80A9-A762A4D72073}" type="slidenum">
+            <a:fld id="{2801A7E4-280E-40EF-976B-9AA34F9DD903}" type="slidenum">
               <a:t>&lt;#&gt;</a:t>
             </a:fld>
           </a:p>
@@ -877,15 +877,15 @@
         <p:spPr>
           <a:xfrm>
             <a:off x="0" y="0"/>
-            <a:ext cx="10079640" cy="4251240"/>
+            <a:ext cx="10079280" cy="4250880"/>
           </a:xfrm>
           <a:custGeom>
             <a:avLst/>
             <a:gdLst>
-              <a:gd name="textAreaLeft" fmla="*/ 0 w 10079640"/>
-              <a:gd name="textAreaRight" fmla="*/ 10080360 w 10079640"/>
-              <a:gd name="textAreaTop" fmla="*/ 0 h 4251240"/>
-              <a:gd name="textAreaBottom" fmla="*/ 4251960 h 4251240"/>
+              <a:gd name="textAreaLeft" fmla="*/ 0 w 10079280"/>
+              <a:gd name="textAreaRight" fmla="*/ 10080360 w 10079280"/>
+              <a:gd name="textAreaTop" fmla="*/ 0 h 4250880"/>
+              <a:gd name="textAreaBottom" fmla="*/ 4251960 h 4250880"/>
             </a:gdLst>
             <a:ahLst/>
             <a:rect l="textAreaLeft" t="textAreaTop" r="textAreaRight" b="textAreaBottom"/>
@@ -959,7 +959,7 @@
         <p:spPr>
           <a:xfrm>
             <a:off x="466200" y="3247560"/>
-            <a:ext cx="9001080" cy="953280"/>
+            <a:ext cx="9000720" cy="952920"/>
           </a:xfrm>
           <a:prstGeom prst="rect">
             <a:avLst/>
@@ -1233,7 +1233,7 @@
         <p:spPr>
           <a:xfrm>
             <a:off x="5579640" y="5129640"/>
-            <a:ext cx="4319280" cy="390600"/>
+            <a:ext cx="4318920" cy="390240"/>
           </a:xfrm>
           <a:prstGeom prst="rect">
             <a:avLst/>
@@ -1305,7 +1305,7 @@
         <p:spPr>
           <a:xfrm>
             <a:off x="7379640" y="4589640"/>
-            <a:ext cx="2519280" cy="390600"/>
+            <a:ext cx="2518920" cy="390240"/>
           </a:xfrm>
           <a:prstGeom prst="rect">
             <a:avLst/>
@@ -1346,7 +1346,7 @@
                 <a:tab algn="l" pos="0"/>
               </a:tabLst>
             </a:pPr>
-            <a:fld id="{D4182A84-72D3-4356-9AC7-694B03769199}" type="slidenum">
+            <a:fld id="{B35CAA80-2ACD-4249-BB62-D288D6B3901F}" type="slidenum">
               <a:rPr b="0" lang="en-US" sz="2600" spc="-1" strike="noStrike">
                 <a:solidFill>
                   <a:srgbClr val="000000"/>
@@ -1377,7 +1377,7 @@
         <p:spPr>
           <a:xfrm>
             <a:off x="7019640" y="4913640"/>
-            <a:ext cx="2879280" cy="390600"/>
+            <a:ext cx="2878920" cy="390240"/>
           </a:xfrm>
           <a:prstGeom prst="rect">
             <a:avLst/>
@@ -1459,15 +1459,15 @@
         <p:spPr>
           <a:xfrm>
             <a:off x="0" y="0"/>
-            <a:ext cx="10079640" cy="4251240"/>
+            <a:ext cx="10079280" cy="4250880"/>
           </a:xfrm>
           <a:custGeom>
             <a:avLst/>
             <a:gdLst>
-              <a:gd name="textAreaLeft" fmla="*/ 0 w 10079640"/>
-              <a:gd name="textAreaRight" fmla="*/ 10080360 w 10079640"/>
-              <a:gd name="textAreaTop" fmla="*/ 0 h 4251240"/>
-              <a:gd name="textAreaBottom" fmla="*/ 4251960 h 4251240"/>
+              <a:gd name="textAreaLeft" fmla="*/ 0 w 10079280"/>
+              <a:gd name="textAreaRight" fmla="*/ 10080360 w 10079280"/>
+              <a:gd name="textAreaTop" fmla="*/ 0 h 4250880"/>
+              <a:gd name="textAreaBottom" fmla="*/ 4251960 h 4250880"/>
             </a:gdLst>
             <a:ahLst/>
             <a:rect l="textAreaLeft" t="textAreaTop" r="textAreaRight" b="textAreaBottom"/>
@@ -1541,7 +1541,7 @@
         <p:spPr>
           <a:xfrm>
             <a:off x="466200" y="3247560"/>
-            <a:ext cx="9001080" cy="953280"/>
+            <a:ext cx="9000720" cy="952920"/>
           </a:xfrm>
           <a:prstGeom prst="rect">
             <a:avLst/>
@@ -1590,7 +1590,7 @@
         <p:spPr>
           <a:xfrm>
             <a:off x="5579640" y="5129640"/>
-            <a:ext cx="4319280" cy="390600"/>
+            <a:ext cx="4318920" cy="390240"/>
           </a:xfrm>
           <a:prstGeom prst="rect">
             <a:avLst/>
@@ -1662,7 +1662,7 @@
         <p:spPr>
           <a:xfrm>
             <a:off x="7379640" y="4589640"/>
-            <a:ext cx="2519280" cy="390600"/>
+            <a:ext cx="2518920" cy="390240"/>
           </a:xfrm>
           <a:prstGeom prst="rect">
             <a:avLst/>
@@ -1703,7 +1703,7 @@
                 <a:tab algn="l" pos="0"/>
               </a:tabLst>
             </a:pPr>
-            <a:fld id="{60043AEF-E930-499F-B291-D91C3810D511}" type="slidenum">
+            <a:fld id="{7388FF40-97B9-485A-B85A-7B347881F351}" type="slidenum">
               <a:rPr b="0" lang="en-US" sz="2600" spc="-1" strike="noStrike">
                 <a:solidFill>
                   <a:srgbClr val="000000"/>
@@ -1734,7 +1734,7 @@
         <p:spPr>
           <a:xfrm>
             <a:off x="7019640" y="4913640"/>
-            <a:ext cx="2879280" cy="390600"/>
+            <a:ext cx="2878920" cy="390240"/>
           </a:xfrm>
           <a:prstGeom prst="rect">
             <a:avLst/>
@@ -2041,15 +2041,15 @@
         <p:spPr>
           <a:xfrm>
             <a:off x="1096920" y="4388760"/>
-            <a:ext cx="8982000" cy="1280160"/>
+            <a:ext cx="8981640" cy="1279800"/>
           </a:xfrm>
           <a:custGeom>
             <a:avLst/>
             <a:gdLst>
-              <a:gd name="textAreaLeft" fmla="*/ 0 w 8982000"/>
-              <a:gd name="textAreaRight" fmla="*/ 8982720 w 8982000"/>
-              <a:gd name="textAreaTop" fmla="*/ 0 h 1280160"/>
-              <a:gd name="textAreaBottom" fmla="*/ 1280880 h 1280160"/>
+              <a:gd name="textAreaLeft" fmla="*/ 0 w 8981640"/>
+              <a:gd name="textAreaRight" fmla="*/ 8982720 w 8981640"/>
+              <a:gd name="textAreaTop" fmla="*/ 0 h 1279800"/>
+              <a:gd name="textAreaBottom" fmla="*/ 1280880 h 1279800"/>
             </a:gdLst>
             <a:ahLst/>
             <a:rect l="textAreaLeft" t="textAreaTop" r="textAreaRight" b="textAreaBottom"/>
@@ -2116,15 +2116,15 @@
         <p:spPr>
           <a:xfrm>
             <a:off x="0" y="0"/>
-            <a:ext cx="10079280" cy="1508400"/>
+            <a:ext cx="10078920" cy="1508040"/>
           </a:xfrm>
           <a:custGeom>
             <a:avLst/>
             <a:gdLst>
-              <a:gd name="textAreaLeft" fmla="*/ 0 w 10079280"/>
-              <a:gd name="textAreaRight" fmla="*/ 10080000 w 10079280"/>
-              <a:gd name="textAreaTop" fmla="*/ 0 h 1508400"/>
-              <a:gd name="textAreaBottom" fmla="*/ 1509120 h 1508400"/>
+              <a:gd name="textAreaLeft" fmla="*/ 0 w 10078920"/>
+              <a:gd name="textAreaRight" fmla="*/ 10080000 w 10078920"/>
+              <a:gd name="textAreaTop" fmla="*/ 0 h 1508040"/>
+              <a:gd name="textAreaBottom" fmla="*/ 1509120 h 1508040"/>
             </a:gdLst>
             <a:ahLst/>
             <a:rect l="textAreaLeft" t="textAreaTop" r="textAreaRight" b="textAreaBottom"/>
@@ -2198,7 +2198,7 @@
         <p:spPr>
           <a:xfrm>
             <a:off x="466200" y="3247560"/>
-            <a:ext cx="9001080" cy="953280"/>
+            <a:ext cx="9000720" cy="952920"/>
           </a:xfrm>
           <a:prstGeom prst="rect">
             <a:avLst/>
@@ -2472,7 +2472,7 @@
         <p:spPr>
           <a:xfrm>
             <a:off x="5579640" y="5129640"/>
-            <a:ext cx="4319280" cy="390600"/>
+            <a:ext cx="4318920" cy="390240"/>
           </a:xfrm>
           <a:prstGeom prst="rect">
             <a:avLst/>
@@ -2544,7 +2544,7 @@
         <p:spPr>
           <a:xfrm>
             <a:off x="7379640" y="4589640"/>
-            <a:ext cx="2519280" cy="390600"/>
+            <a:ext cx="2518920" cy="390240"/>
           </a:xfrm>
           <a:prstGeom prst="rect">
             <a:avLst/>
@@ -2585,7 +2585,7 @@
                 <a:tab algn="l" pos="0"/>
               </a:tabLst>
             </a:pPr>
-            <a:fld id="{C3C8CC35-3181-4A21-86DC-8F0B5AF9A8FE}" type="slidenum">
+            <a:fld id="{70FEA26B-19E1-4999-A157-C8DBC7199FD0}" type="slidenum">
               <a:rPr b="0" lang="en-US" sz="2600" spc="-1" strike="noStrike">
                 <a:solidFill>
                   <a:srgbClr val="000000"/>
@@ -2616,7 +2616,7 @@
         <p:spPr>
           <a:xfrm>
             <a:off x="7019640" y="4913640"/>
-            <a:ext cx="2879280" cy="390600"/>
+            <a:ext cx="2878920" cy="390240"/>
           </a:xfrm>
           <a:prstGeom prst="rect">
             <a:avLst/>
@@ -2698,15 +2698,15 @@
         <p:spPr>
           <a:xfrm>
             <a:off x="1096920" y="4388760"/>
-            <a:ext cx="8982000" cy="1280160"/>
+            <a:ext cx="8981640" cy="1279800"/>
           </a:xfrm>
           <a:custGeom>
             <a:avLst/>
             <a:gdLst>
-              <a:gd name="textAreaLeft" fmla="*/ 0 w 8982000"/>
-              <a:gd name="textAreaRight" fmla="*/ 8982720 w 8982000"/>
-              <a:gd name="textAreaTop" fmla="*/ 0 h 1280160"/>
-              <a:gd name="textAreaBottom" fmla="*/ 1280880 h 1280160"/>
+              <a:gd name="textAreaLeft" fmla="*/ 0 w 8981640"/>
+              <a:gd name="textAreaRight" fmla="*/ 8982720 w 8981640"/>
+              <a:gd name="textAreaTop" fmla="*/ 0 h 1279800"/>
+              <a:gd name="textAreaBottom" fmla="*/ 1280880 h 1279800"/>
             </a:gdLst>
             <a:ahLst/>
             <a:rect l="textAreaLeft" t="textAreaTop" r="textAreaRight" b="textAreaBottom"/>
@@ -2773,15 +2773,15 @@
         <p:spPr>
           <a:xfrm>
             <a:off x="0" y="411120"/>
-            <a:ext cx="10079280" cy="5257800"/>
+            <a:ext cx="10078920" cy="5257440"/>
           </a:xfrm>
           <a:custGeom>
             <a:avLst/>
             <a:gdLst>
-              <a:gd name="textAreaLeft" fmla="*/ 0 w 10079280"/>
-              <a:gd name="textAreaRight" fmla="*/ 10080000 w 10079280"/>
-              <a:gd name="textAreaTop" fmla="*/ 0 h 5257800"/>
-              <a:gd name="textAreaBottom" fmla="*/ 5258520 h 5257800"/>
+              <a:gd name="textAreaLeft" fmla="*/ 0 w 10078920"/>
+              <a:gd name="textAreaRight" fmla="*/ 10080000 w 10078920"/>
+              <a:gd name="textAreaTop" fmla="*/ 0 h 5257440"/>
+              <a:gd name="textAreaBottom" fmla="*/ 5258520 h 5257440"/>
             </a:gdLst>
             <a:ahLst/>
             <a:rect l="textAreaLeft" t="textAreaTop" r="textAreaRight" b="textAreaBottom"/>
@@ -2854,15 +2854,15 @@
         <p:spPr>
           <a:xfrm>
             <a:off x="0" y="0"/>
-            <a:ext cx="10079640" cy="1713960"/>
+            <a:ext cx="10079280" cy="1713600"/>
           </a:xfrm>
           <a:custGeom>
             <a:avLst/>
             <a:gdLst>
-              <a:gd name="textAreaLeft" fmla="*/ 0 w 10079640"/>
-              <a:gd name="textAreaRight" fmla="*/ 10080360 w 10079640"/>
-              <a:gd name="textAreaTop" fmla="*/ 0 h 1713960"/>
-              <a:gd name="textAreaBottom" fmla="*/ 1714680 h 1713960"/>
+              <a:gd name="textAreaLeft" fmla="*/ 0 w 10079280"/>
+              <a:gd name="textAreaRight" fmla="*/ 10080360 w 10079280"/>
+              <a:gd name="textAreaTop" fmla="*/ 0 h 1713600"/>
+              <a:gd name="textAreaBottom" fmla="*/ 1714680 h 1713600"/>
             </a:gdLst>
             <a:ahLst/>
             <a:rect l="textAreaLeft" t="textAreaTop" r="textAreaRight" b="textAreaBottom"/>
@@ -2936,7 +2936,7 @@
         <p:spPr>
           <a:xfrm>
             <a:off x="466200" y="3247560"/>
-            <a:ext cx="9001080" cy="953280"/>
+            <a:ext cx="9000720" cy="952920"/>
           </a:xfrm>
           <a:prstGeom prst="rect">
             <a:avLst/>
@@ -3210,7 +3210,7 @@
         <p:spPr>
           <a:xfrm>
             <a:off x="5579640" y="5129640"/>
-            <a:ext cx="4319280" cy="390600"/>
+            <a:ext cx="4318920" cy="390240"/>
           </a:xfrm>
           <a:prstGeom prst="rect">
             <a:avLst/>
@@ -3282,7 +3282,7 @@
         <p:spPr>
           <a:xfrm>
             <a:off x="7379640" y="4589640"/>
-            <a:ext cx="2519280" cy="390600"/>
+            <a:ext cx="2518920" cy="390240"/>
           </a:xfrm>
           <a:prstGeom prst="rect">
             <a:avLst/>
@@ -3323,7 +3323,7 @@
                 <a:tab algn="l" pos="0"/>
               </a:tabLst>
             </a:pPr>
-            <a:fld id="{9EDAB89F-7489-4C77-80FD-55500ECA5B02}" type="slidenum">
+            <a:fld id="{3B42C98A-53F4-4906-99AC-C09F16519047}" type="slidenum">
               <a:rPr b="0" lang="en-US" sz="2600" spc="-1" strike="noStrike">
                 <a:solidFill>
                   <a:srgbClr val="000000"/>
@@ -3354,7 +3354,7 @@
         <p:spPr>
           <a:xfrm>
             <a:off x="7019640" y="4913640"/>
-            <a:ext cx="2879280" cy="390600"/>
+            <a:ext cx="2878920" cy="390240"/>
           </a:xfrm>
           <a:prstGeom prst="rect">
             <a:avLst/>
@@ -3436,15 +3436,15 @@
         <p:spPr>
           <a:xfrm>
             <a:off x="1403640" y="4388760"/>
-            <a:ext cx="8675640" cy="1279800"/>
+            <a:ext cx="8675280" cy="1279440"/>
           </a:xfrm>
           <a:custGeom>
             <a:avLst/>
             <a:gdLst>
-              <a:gd name="textAreaLeft" fmla="*/ 0 w 8675640"/>
-              <a:gd name="textAreaRight" fmla="*/ 8676360 w 8675640"/>
-              <a:gd name="textAreaTop" fmla="*/ 0 h 1279800"/>
-              <a:gd name="textAreaBottom" fmla="*/ 1280520 h 1279800"/>
+              <a:gd name="textAreaLeft" fmla="*/ 0 w 8675280"/>
+              <a:gd name="textAreaRight" fmla="*/ 8676360 w 8675280"/>
+              <a:gd name="textAreaTop" fmla="*/ 0 h 1279440"/>
+              <a:gd name="textAreaBottom" fmla="*/ 1280520 h 1279440"/>
             </a:gdLst>
             <a:ahLst/>
             <a:rect l="textAreaLeft" t="textAreaTop" r="textAreaRight" b="textAreaBottom"/>
@@ -3506,15 +3506,15 @@
         <p:spPr>
           <a:xfrm>
             <a:off x="0" y="0"/>
-            <a:ext cx="10079280" cy="2399760"/>
+            <a:ext cx="10078920" cy="2399400"/>
           </a:xfrm>
           <a:custGeom>
             <a:avLst/>
             <a:gdLst>
-              <a:gd name="textAreaLeft" fmla="*/ 0 w 10079280"/>
-              <a:gd name="textAreaRight" fmla="*/ 10080000 w 10079280"/>
-              <a:gd name="textAreaTop" fmla="*/ 0 h 2399760"/>
-              <a:gd name="textAreaBottom" fmla="*/ 2400480 h 2399760"/>
+              <a:gd name="textAreaLeft" fmla="*/ 0 w 10078920"/>
+              <a:gd name="textAreaRight" fmla="*/ 10080000 w 10078920"/>
+              <a:gd name="textAreaTop" fmla="*/ 0 h 2399400"/>
+              <a:gd name="textAreaBottom" fmla="*/ 2400480 h 2399400"/>
             </a:gdLst>
             <a:ahLst/>
             <a:rect l="textAreaLeft" t="textAreaTop" r="textAreaRight" b="textAreaBottom"/>
@@ -3579,15 +3579,15 @@
         <p:spPr>
           <a:xfrm>
             <a:off x="0" y="0"/>
-            <a:ext cx="10079280" cy="2399760"/>
+            <a:ext cx="10078920" cy="2399400"/>
           </a:xfrm>
           <a:custGeom>
             <a:avLst/>
             <a:gdLst>
-              <a:gd name="textAreaLeft" fmla="*/ 0 w 10079280"/>
-              <a:gd name="textAreaRight" fmla="*/ 10080000 w 10079280"/>
-              <a:gd name="textAreaTop" fmla="*/ 0 h 2399760"/>
-              <a:gd name="textAreaBottom" fmla="*/ 2400480 h 2399760"/>
+              <a:gd name="textAreaLeft" fmla="*/ 0 w 10078920"/>
+              <a:gd name="textAreaRight" fmla="*/ 10080000 w 10078920"/>
+              <a:gd name="textAreaTop" fmla="*/ 0 h 2399400"/>
+              <a:gd name="textAreaBottom" fmla="*/ 2400480 h 2399400"/>
             </a:gdLst>
             <a:ahLst/>
             <a:rect l="textAreaLeft" t="textAreaTop" r="textAreaRight" b="textAreaBottom"/>
@@ -3652,15 +3652,15 @@
         <p:spPr>
           <a:xfrm>
             <a:off x="1403640" y="4388760"/>
-            <a:ext cx="8675640" cy="1279800"/>
+            <a:ext cx="8675280" cy="1279440"/>
           </a:xfrm>
           <a:custGeom>
             <a:avLst/>
             <a:gdLst>
-              <a:gd name="textAreaLeft" fmla="*/ 0 w 8675640"/>
-              <a:gd name="textAreaRight" fmla="*/ 8676360 w 8675640"/>
-              <a:gd name="textAreaTop" fmla="*/ 0 h 1279800"/>
-              <a:gd name="textAreaBottom" fmla="*/ 1280520 h 1279800"/>
+              <a:gd name="textAreaLeft" fmla="*/ 0 w 8675280"/>
+              <a:gd name="textAreaRight" fmla="*/ 8676360 w 8675280"/>
+              <a:gd name="textAreaTop" fmla="*/ 0 h 1279440"/>
+              <a:gd name="textAreaBottom" fmla="*/ 1280520 h 1279440"/>
             </a:gdLst>
             <a:ahLst/>
             <a:rect l="textAreaLeft" t="textAreaTop" r="textAreaRight" b="textAreaBottom"/>
@@ -3722,15 +3722,15 @@
         <p:spPr>
           <a:xfrm>
             <a:off x="6480" y="-9720"/>
-            <a:ext cx="10079280" cy="2468160"/>
+            <a:ext cx="10078920" cy="2467800"/>
           </a:xfrm>
           <a:custGeom>
             <a:avLst/>
             <a:gdLst>
-              <a:gd name="textAreaLeft" fmla="*/ 0 w 10079280"/>
-              <a:gd name="textAreaRight" fmla="*/ 10080000 w 10079280"/>
-              <a:gd name="textAreaTop" fmla="*/ 0 h 2468160"/>
-              <a:gd name="textAreaBottom" fmla="*/ 2468880 h 2468160"/>
+              <a:gd name="textAreaLeft" fmla="*/ 0 w 10078920"/>
+              <a:gd name="textAreaRight" fmla="*/ 10080000 w 10078920"/>
+              <a:gd name="textAreaTop" fmla="*/ 0 h 2467800"/>
+              <a:gd name="textAreaBottom" fmla="*/ 2468880 h 2467800"/>
             </a:gdLst>
             <a:ahLst/>
             <a:rect l="textAreaLeft" t="textAreaTop" r="textAreaRight" b="textAreaBottom"/>
@@ -3800,15 +3800,15 @@
         <p:spPr>
           <a:xfrm>
             <a:off x="1403280" y="4388760"/>
-            <a:ext cx="8675640" cy="1279800"/>
+            <a:ext cx="8675280" cy="1279440"/>
           </a:xfrm>
           <a:custGeom>
             <a:avLst/>
             <a:gdLst>
-              <a:gd name="textAreaLeft" fmla="*/ 0 w 8675640"/>
-              <a:gd name="textAreaRight" fmla="*/ 8676360 w 8675640"/>
-              <a:gd name="textAreaTop" fmla="*/ 0 h 1279800"/>
-              <a:gd name="textAreaBottom" fmla="*/ 1280520 h 1279800"/>
+              <a:gd name="textAreaLeft" fmla="*/ 0 w 8675280"/>
+              <a:gd name="textAreaRight" fmla="*/ 8676360 w 8675280"/>
+              <a:gd name="textAreaTop" fmla="*/ 0 h 1279440"/>
+              <a:gd name="textAreaBottom" fmla="*/ 1280520 h 1279440"/>
             </a:gdLst>
             <a:ahLst/>
             <a:rect l="textAreaLeft" t="textAreaTop" r="textAreaRight" b="textAreaBottom"/>
@@ -3869,8 +3869,8 @@
         </p:nvSpPr>
         <p:spPr>
           <a:xfrm rot="20952000">
-            <a:off x="223560" y="1917000"/>
-            <a:ext cx="9401400" cy="2593440"/>
+            <a:off x="223200" y="1917000"/>
+            <a:ext cx="9401040" cy="2593080"/>
           </a:xfrm>
           <a:prstGeom prst="roundRect">
             <a:avLst>
@@ -3922,7 +3922,7 @@
         <p:spPr>
           <a:xfrm>
             <a:off x="273960" y="2759400"/>
-            <a:ext cx="639360" cy="1225080"/>
+            <a:ext cx="639000" cy="1224720"/>
           </a:xfrm>
           <a:prstGeom prst="rect">
             <a:avLst/>
@@ -3976,7 +3976,7 @@
         <p:spPr>
           <a:xfrm>
             <a:off x="9215640" y="3517560"/>
-            <a:ext cx="639360" cy="1225080"/>
+            <a:ext cx="639000" cy="1224720"/>
           </a:xfrm>
           <a:prstGeom prst="rect">
             <a:avLst/>
@@ -4034,7 +4034,7 @@
         <p:spPr>
           <a:xfrm>
             <a:off x="466200" y="3247560"/>
-            <a:ext cx="9001080" cy="953280"/>
+            <a:ext cx="9000720" cy="952920"/>
           </a:xfrm>
           <a:prstGeom prst="rect">
             <a:avLst/>
@@ -4308,7 +4308,7 @@
         <p:spPr>
           <a:xfrm>
             <a:off x="5579640" y="5129640"/>
-            <a:ext cx="4319280" cy="390600"/>
+            <a:ext cx="4318920" cy="390240"/>
           </a:xfrm>
           <a:prstGeom prst="rect">
             <a:avLst/>
@@ -4380,7 +4380,7 @@
         <p:spPr>
           <a:xfrm>
             <a:off x="7379640" y="4589640"/>
-            <a:ext cx="2519280" cy="390600"/>
+            <a:ext cx="2518920" cy="390240"/>
           </a:xfrm>
           <a:prstGeom prst="rect">
             <a:avLst/>
@@ -4421,7 +4421,7 @@
                 <a:tab algn="l" pos="0"/>
               </a:tabLst>
             </a:pPr>
-            <a:fld id="{2DB0174F-4DB8-40BD-8AAB-9606F39C450C}" type="slidenum">
+            <a:fld id="{5EDF20C6-4A7D-4F0A-A8FA-76A1F83DE549}" type="slidenum">
               <a:rPr b="0" lang="en-US" sz="2600" spc="-1" strike="noStrike">
                 <a:solidFill>
                   <a:srgbClr val="000000"/>
@@ -4452,7 +4452,7 @@
         <p:spPr>
           <a:xfrm>
             <a:off x="7019640" y="4913640"/>
-            <a:ext cx="2879280" cy="390600"/>
+            <a:ext cx="2878920" cy="390240"/>
           </a:xfrm>
           <a:prstGeom prst="rect">
             <a:avLst/>
@@ -4537,8 +4537,8 @@
         </p:nvSpPr>
         <p:spPr>
           <a:xfrm rot="21114000">
-            <a:off x="445320" y="2255040"/>
-            <a:ext cx="9001800" cy="1607040"/>
+            <a:off x="444960" y="2255040"/>
+            <a:ext cx="9001440" cy="1606680"/>
           </a:xfrm>
           <a:prstGeom prst="rect">
             <a:avLst/>
@@ -4597,8 +4597,8 @@
         </p:nvSpPr>
         <p:spPr>
           <a:xfrm rot="21117000">
-            <a:off x="614160" y="3528000"/>
-            <a:ext cx="8802720" cy="618840"/>
+            <a:off x="613800" y="3528000"/>
+            <a:ext cx="8802360" cy="618480"/>
           </a:xfrm>
           <a:prstGeom prst="rect">
             <a:avLst/>
@@ -4630,7 +4630,7 @@
               <a:buFont typeface="Wingdings" charset="2"/>
               <a:buChar char=""/>
             </a:pPr>
-            <a:fld id="{9CF69D4E-87E0-4446-A337-661B66E30579}" type="author">
+            <a:fld id="{7853BC2B-E206-4CAD-8D33-64E3D4757E23}" type="author">
               <a:rPr b="0" lang="en-US" sz="3200" spc="-1" strike="noStrike">
                 <a:solidFill>
                   <a:srgbClr val="000000"/>
@@ -4705,8 +4705,8 @@
         </p:nvSpPr>
         <p:spPr>
           <a:xfrm rot="21111000">
-            <a:off x="124200" y="-132840"/>
-            <a:ext cx="9001080" cy="953280"/>
+            <a:off x="124200" y="-132480"/>
+            <a:ext cx="9000720" cy="952920"/>
           </a:xfrm>
           <a:prstGeom prst="rect">
             <a:avLst/>
@@ -4762,7 +4762,7 @@
         <p:txBody>
           <a:bodyPr/>
           <a:p>
-            <a:fld id="{3D852957-D941-4563-BADF-D26936D38E1C}" type="slidenum">
+            <a:fld id="{4A6CFF16-52E9-463F-9EB8-156684F9BDE2}" type="slidenum">
               <a:t>2</a:t>
             </a:fld>
           </a:p>
@@ -4815,7 +4815,7 @@
         <p:spPr>
           <a:xfrm rot="21111000">
             <a:off x="91440" y="67320"/>
-            <a:ext cx="9001080" cy="953280"/>
+            <a:ext cx="9000720" cy="952920"/>
           </a:xfrm>
           <a:prstGeom prst="rect">
             <a:avLst/>
@@ -4870,7 +4870,7 @@
         <p:spPr>
           <a:xfrm>
             <a:off x="432000" y="2057400"/>
-            <a:ext cx="5511240" cy="2158200"/>
+            <a:ext cx="5510880" cy="2157840"/>
           </a:xfrm>
           <a:prstGeom prst="rect">
             <a:avLst/>
@@ -4894,7 +4894,7 @@
         <p:txBody>
           <a:bodyPr/>
           <a:p>
-            <a:fld id="{3BD625DD-94CF-4326-9499-4F7F918802D0}" type="slidenum">
+            <a:fld id="{DD5B1455-8623-47CF-9658-C3CA977E6D5C}" type="slidenum">
               <a:t>3</a:t>
             </a:fld>
           </a:p>
@@ -4947,7 +4947,7 @@
         <p:spPr>
           <a:xfrm rot="21111000">
             <a:off x="91440" y="67320"/>
-            <a:ext cx="9001080" cy="953280"/>
+            <a:ext cx="9000720" cy="952920"/>
           </a:xfrm>
           <a:prstGeom prst="rect">
             <a:avLst/>
@@ -5002,7 +5002,7 @@
         <p:spPr>
           <a:xfrm>
             <a:off x="503640" y="1785240"/>
-            <a:ext cx="8869320" cy="3287880"/>
+            <a:ext cx="8868960" cy="3287520"/>
           </a:xfrm>
           <a:prstGeom prst="rect">
             <a:avLst/>
@@ -5045,7 +5045,7 @@
         <p:spPr>
           <a:xfrm>
             <a:off x="400320" y="1759320"/>
-            <a:ext cx="4171320" cy="3269520"/>
+            <a:ext cx="4170960" cy="3269160"/>
           </a:xfrm>
           <a:prstGeom prst="rect">
             <a:avLst/>
@@ -5069,7 +5069,7 @@
         <p:txBody>
           <a:bodyPr/>
           <a:p>
-            <a:fld id="{1D018EA2-B3F9-48FD-AA8A-0C1A52CF0EA8}" type="slidenum">
+            <a:fld id="{0F7665B2-CAE5-4826-A90A-624592D4E477}" type="slidenum">
               <a:t>4</a:t>
             </a:fld>
           </a:p>
@@ -5122,7 +5122,7 @@
         <p:spPr>
           <a:xfrm rot="21111000">
             <a:off x="91440" y="67320"/>
-            <a:ext cx="9001080" cy="953280"/>
+            <a:ext cx="9000720" cy="952920"/>
           </a:xfrm>
           <a:prstGeom prst="rect">
             <a:avLst/>
@@ -5176,8 +5176,8 @@
         </p:blipFill>
         <p:spPr>
           <a:xfrm>
-            <a:off x="5029200" y="1733760"/>
-            <a:ext cx="4710960" cy="1237680"/>
+            <a:off x="457200" y="1841760"/>
+            <a:ext cx="4533480" cy="901440"/>
           </a:xfrm>
           <a:prstGeom prst="rect">
             <a:avLst/>
@@ -5201,7 +5201,7 @@
         <p:txBody>
           <a:bodyPr/>
           <a:p>
-            <a:fld id="{45C3A2BD-E1F7-4ACF-8F5E-3BD4F67E7EBB}" type="slidenum">
+            <a:fld id="{C51C60C1-803F-449D-9C9F-B63B2D5BA403}" type="slidenum">
               <a:t>5</a:t>
             </a:fld>
           </a:p>
@@ -5254,7 +5254,7 @@
         <p:spPr>
           <a:xfrm rot="21111000">
             <a:off x="91440" y="67320"/>
-            <a:ext cx="9001080" cy="953280"/>
+            <a:ext cx="9000720" cy="952920"/>
           </a:xfrm>
           <a:prstGeom prst="rect">
             <a:avLst/>
@@ -5309,7 +5309,7 @@
         <p:spPr>
           <a:xfrm>
             <a:off x="457200" y="1748880"/>
-            <a:ext cx="3446280" cy="3737160"/>
+            <a:ext cx="3445920" cy="3736800"/>
           </a:xfrm>
           <a:prstGeom prst="rect">
             <a:avLst/>
@@ -5333,7 +5333,7 @@
         <p:txBody>
           <a:bodyPr/>
           <a:p>
-            <a:fld id="{B45770CE-5143-4E45-BD27-30EEA967B5B5}" type="slidenum">
+            <a:fld id="{0C9492FE-3557-424A-B33D-5C5A0A6645BD}" type="slidenum">
               <a:t>6</a:t>
             </a:fld>
           </a:p>
@@ -5386,7 +5386,7 @@
         <p:spPr>
           <a:xfrm rot="21111000">
             <a:off x="91440" y="67320"/>
-            <a:ext cx="9001080" cy="953280"/>
+            <a:ext cx="9000720" cy="952920"/>
           </a:xfrm>
           <a:prstGeom prst="rect">
             <a:avLst/>
@@ -5441,7 +5441,7 @@
         <p:spPr>
           <a:xfrm>
             <a:off x="609840" y="1886400"/>
-            <a:ext cx="6476400" cy="2685240"/>
+            <a:ext cx="6476040" cy="2684880"/>
           </a:xfrm>
           <a:prstGeom prst="rect">
             <a:avLst/>
@@ -5465,7 +5465,7 @@
         <p:txBody>
           <a:bodyPr/>
           <a:p>
-            <a:fld id="{38BDEDF3-B0EC-4132-99C9-89B403F2872F}" type="slidenum">
+            <a:fld id="{DD995E3B-0B3E-40A3-A077-3417BD9D9A70}" type="slidenum">
               <a:t>7</a:t>
             </a:fld>
           </a:p>
@@ -5518,7 +5518,7 @@
         <p:spPr>
           <a:xfrm rot="21111000">
             <a:off x="91440" y="67320"/>
-            <a:ext cx="9001080" cy="953280"/>
+            <a:ext cx="9000720" cy="952920"/>
           </a:xfrm>
           <a:prstGeom prst="rect">
             <a:avLst/>
@@ -5572,8 +5572,8 @@
         </p:blipFill>
         <p:spPr>
           <a:xfrm>
-            <a:off x="235800" y="1886400"/>
-            <a:ext cx="5479200" cy="2228400"/>
+            <a:off x="685800" y="3723120"/>
+            <a:ext cx="4335840" cy="1763280"/>
           </a:xfrm>
           <a:prstGeom prst="rect">
             <a:avLst/>
@@ -5583,6 +5583,29 @@
           </a:ln>
         </p:spPr>
       </p:pic>
+      <p:pic>
+        <p:nvPicPr>
+          <p:cNvPr id="67" name="" descr=""/>
+          <p:cNvPicPr/>
+          <p:nvPr/>
+        </p:nvPicPr>
+        <p:blipFill>
+          <a:blip r:embed="rId2"/>
+          <a:stretch/>
+        </p:blipFill>
+        <p:spPr>
+          <a:xfrm>
+            <a:off x="685800" y="1828800"/>
+            <a:ext cx="7315200" cy="1811880"/>
+          </a:xfrm>
+          <a:prstGeom prst="rect">
+            <a:avLst/>
+          </a:prstGeom>
+          <a:ln w="0">
+            <a:noFill/>
+          </a:ln>
+        </p:spPr>
+      </p:pic>
       <p:sp>
         <p:nvSpPr>
           <p:cNvPr id="3" name="PlaceHolder 2"/>
@@ -5597,7 +5620,7 @@
         <p:txBody>
           <a:bodyPr/>
           <a:p>
-            <a:fld id="{22C258C8-2C44-476E-9D09-C4E005BD09EE}" type="slidenum">
+            <a:fld id="{A120E36C-AD25-4246-A68C-166A184B8599}" type="slidenum">
               <a:t>8</a:t>
             </a:fld>
           </a:p>
@@ -5639,7 +5662,7 @@
       </p:grpSpPr>
       <p:sp>
         <p:nvSpPr>
-          <p:cNvPr id="67" name="PlaceHolder 1"/>
+          <p:cNvPr id="68" name="PlaceHolder 1"/>
           <p:cNvSpPr>
             <a:spLocks noGrp="1"/>
           </p:cNvSpPr>
@@ -5649,8 +5672,8 @@
         </p:nvSpPr>
         <p:spPr>
           <a:xfrm rot="21114000">
-            <a:off x="445320" y="2255040"/>
-            <a:ext cx="9001800" cy="1607040"/>
+            <a:off x="444960" y="2255040"/>
+            <a:ext cx="9001440" cy="1606680"/>
           </a:xfrm>
           <a:prstGeom prst="rect">
             <a:avLst/>
@@ -5694,14 +5717,14 @@
       </p:sp>
       <p:sp>
         <p:nvSpPr>
-          <p:cNvPr id="68" name=""/>
+          <p:cNvPr id="69" name=""/>
           <p:cNvSpPr/>
           <p:nvPr/>
         </p:nvSpPr>
         <p:spPr>
           <a:xfrm rot="21117000">
-            <a:off x="614160" y="3528000"/>
-            <a:ext cx="8802720" cy="618840"/>
+            <a:off x="613800" y="3528000"/>
+            <a:ext cx="8802360" cy="618480"/>
           </a:xfrm>
           <a:prstGeom prst="rect">
             <a:avLst/>
@@ -5733,7 +5756,7 @@
               <a:buFont typeface="Wingdings" charset="2"/>
               <a:buChar char=""/>
             </a:pPr>
-            <a:fld id="{9982DB90-C265-4913-A7C5-5A51F8746BCD}" type="author">
+            <a:fld id="{482B6D1A-708F-4B97-9002-9132BD8D92EE}" type="author">
               <a:rPr b="0" lang="en-US" sz="2400" spc="-1" strike="noStrike">
                 <a:solidFill>
                   <a:srgbClr val="000000"/>

</xml_diff>